<commit_message>
Two slides on literature review and research problem added
</commit_message>
<xml_diff>
--- a/presentation/disease_spreading_presentation.pptx
+++ b/presentation/disease_spreading_presentation.pptx
@@ -5,22 +5,24 @@
     <p:sldMasterId id="2147483660" r:id="rId1"/>
   </p:sldMasterIdLst>
   <p:notesMasterIdLst>
-    <p:notesMasterId r:id="rId15"/>
+    <p:notesMasterId r:id="rId17"/>
   </p:notesMasterIdLst>
   <p:sldIdLst>
     <p:sldId id="261" r:id="rId2"/>
     <p:sldId id="263" r:id="rId3"/>
     <p:sldId id="262" r:id="rId4"/>
-    <p:sldId id="264" r:id="rId5"/>
-    <p:sldId id="265" r:id="rId6"/>
-    <p:sldId id="266" r:id="rId7"/>
-    <p:sldId id="273" r:id="rId8"/>
-    <p:sldId id="267" r:id="rId9"/>
-    <p:sldId id="268" r:id="rId10"/>
-    <p:sldId id="272" r:id="rId11"/>
-    <p:sldId id="271" r:id="rId12"/>
-    <p:sldId id="270" r:id="rId13"/>
-    <p:sldId id="274" r:id="rId14"/>
+    <p:sldId id="275" r:id="rId5"/>
+    <p:sldId id="276" r:id="rId6"/>
+    <p:sldId id="264" r:id="rId7"/>
+    <p:sldId id="265" r:id="rId8"/>
+    <p:sldId id="266" r:id="rId9"/>
+    <p:sldId id="273" r:id="rId10"/>
+    <p:sldId id="267" r:id="rId11"/>
+    <p:sldId id="268" r:id="rId12"/>
+    <p:sldId id="272" r:id="rId13"/>
+    <p:sldId id="271" r:id="rId14"/>
+    <p:sldId id="270" r:id="rId15"/>
+    <p:sldId id="274" r:id="rId16"/>
   </p:sldIdLst>
   <p:sldSz cx="9144000" cy="6858000" type="screen4x3"/>
   <p:notesSz cx="6858000" cy="9144000"/>
@@ -121,7 +123,7 @@
   </p:defaultTextStyle>
   <p:extLst>
     <p:ext uri="{EFAFB233-063F-42B5-8137-9DF3F51BA10A}">
-      <p15:sldGuideLst xmlns:p15="http://schemas.microsoft.com/office/powerpoint/2012/main" xmlns="">
+      <p15:sldGuideLst xmlns:p15="http://schemas.microsoft.com/office/powerpoint/2012/main">
         <p15:guide id="1" orient="horz" pos="2160">
           <p15:clr>
             <a:srgbClr val="A4A3A4"/>
@@ -220,7 +222,7 @@
           <a:p>
             <a:fld id="{7E88FFC7-8966-4ECA-A355-BC3091E12B73}" type="datetimeFigureOut">
               <a:rPr lang="en-US" smtClean="0"/>
-              <a:t>12/14/15</a:t>
+              <a:t>12/15/2015</a:t>
             </a:fld>
             <a:endParaRPr lang="en-US"/>
           </a:p>
@@ -751,31 +753,22 @@
           <a:lstStyle/>
           <a:p>
             <a:r>
-              <a:rPr lang="en-US" dirty="0" smtClean="0"/>
-              <a:t>Now before</a:t>
-            </a:r>
-            <a:r>
-              <a:rPr lang="en-US" baseline="0" dirty="0" smtClean="0"/>
-              <a:t> you think the model has too many hyper parameters let me explain you the physical meaning of the parameters and how we might sensibly set them. </a:t>
-            </a:r>
-          </a:p>
-          <a:p>
-            <a:endParaRPr lang="en-US" baseline="0" dirty="0" smtClean="0"/>
-          </a:p>
-          <a:p>
-            <a:r>
-              <a:rPr lang="en-US" baseline="0" dirty="0" smtClean="0"/>
-              <a:t>Point 5 - </a:t>
-            </a:r>
-            <a:r>
-              <a:rPr lang="en-US" dirty="0" smtClean="0"/>
-              <a:t>Let us assume that two</a:t>
-            </a:r>
-            <a:r>
-              <a:rPr lang="en-US" baseline="0" dirty="0" smtClean="0"/>
-              <a:t> causes have same effect for example earthquake can make you house tremble. Same can happen if a truck hits your house. Now if you know only that you house trembled then you have equal probability of earthquake and a truck hitting your house. But if you know that there was an earthquake the then what is the probability of a truck hitting at the same time? It is much less. So knowledge about one cause explains away the effect. Here is a similar thing happening. If a node is connected to many different nodes its influence gets washed away.</a:t>
-            </a:r>
-            <a:endParaRPr lang="en-US" dirty="0"/>
+              <a:rPr lang="en-GB" dirty="0" smtClean="0"/>
+              <a:t>SIR</a:t>
+            </a:r>
+            <a:r>
+              <a:rPr lang="en-GB" baseline="0" dirty="0" smtClean="0"/>
+              <a:t> and SIS models are based on compartmentalization of the whole population into respectively two or three compartments and study the evolution of number of individuals in each compartments. Correspondingly they use two or three differential equations to model population dynamic. These models have the disadvantage that they cannot account for the dynamics that may arise due to individual behaviour.</a:t>
+            </a:r>
+          </a:p>
+          <a:p>
+            <a:r>
+              <a:rPr lang="en-GB" baseline="0" dirty="0" smtClean="0"/>
+              <a:t>Network Theory Based models try to capture the transfer of disease from one individual to another and study the dynamics of evolution of the epidemics. Based on the method of simulation of spread of disease, different methods are used. In one of the models, rate with which a node gets infected is equal to product of transmission rate and number of infected neighbours. In one of the models, a randomly chosen vertex can probabilistically infect any or all of its neighbours.</a:t>
+            </a:r>
+          </a:p>
+          <a:p>
+            <a:endParaRPr lang="en-GB" dirty="0"/>
           </a:p>
         </p:txBody>
       </p:sp>
@@ -796,7 +789,7 @@
           <a:p>
             <a:fld id="{0FE4AD66-8E5C-48F9-B0A6-E353D58EB762}" type="slidenum">
               <a:rPr lang="en-US" smtClean="0"/>
-              <a:t>5</a:t>
+              <a:t>4</a:t>
             </a:fld>
             <a:endParaRPr lang="en-US"/>
           </a:p>
@@ -805,7 +798,7 @@
     </p:spTree>
     <p:extLst>
       <p:ext uri="{BB962C8B-B14F-4D97-AF65-F5344CB8AC3E}">
-        <p14:creationId xmlns:p14="http://schemas.microsoft.com/office/powerpoint/2010/main" val="4200700982"/>
+        <p14:creationId xmlns:p14="http://schemas.microsoft.com/office/powerpoint/2010/main" val="3004335316"/>
       </p:ext>
     </p:extLst>
   </p:cSld>
@@ -860,18 +853,52 @@
           <a:lstStyle/>
           <a:p>
             <a:r>
-              <a:rPr lang="en-US" dirty="0" smtClean="0"/>
-              <a:t>We decided to take the execution hit in</a:t>
-            </a:r>
-            <a:r>
-              <a:rPr lang="en-US" baseline="0" dirty="0" smtClean="0"/>
-              <a:t> exchange to</a:t>
-            </a:r>
-            <a:r>
-              <a:rPr lang="en-US" dirty="0" smtClean="0"/>
-              <a:t> this convenience.</a:t>
-            </a:r>
-            <a:endParaRPr lang="en-US" dirty="0"/>
+              <a:rPr lang="en-GB" dirty="0" smtClean="0"/>
+              <a:t>We define</a:t>
+            </a:r>
+            <a:r>
+              <a:rPr lang="en-GB" baseline="0" dirty="0" smtClean="0"/>
+              <a:t> a robustness metric and use it to study robustness of randomly generated graphs. We use the cascading model by </a:t>
+            </a:r>
+            <a:r>
+              <a:rPr lang="en-GB" baseline="0" dirty="0" err="1" smtClean="0"/>
+              <a:t>Lubos</a:t>
+            </a:r>
+            <a:r>
+              <a:rPr lang="en-GB" baseline="0" dirty="0" smtClean="0"/>
+              <a:t> et. al. to model the evolution of disease spread. </a:t>
+            </a:r>
+          </a:p>
+          <a:p>
+            <a:endParaRPr lang="en-GB" baseline="0" dirty="0" smtClean="0"/>
+          </a:p>
+          <a:p>
+            <a:r>
+              <a:rPr lang="en-GB" baseline="0" dirty="0" smtClean="0"/>
+              <a:t>Rather than trying to model evolution of epidemic within a given population, as done by the models discussed earlier, we interpret the spread of disease from one city to another.</a:t>
+            </a:r>
+          </a:p>
+          <a:p>
+            <a:endParaRPr lang="en-GB" baseline="0" dirty="0" smtClean="0"/>
+          </a:p>
+          <a:p>
+            <a:r>
+              <a:rPr lang="en-GB" baseline="0" dirty="0" smtClean="0"/>
+              <a:t>We also explore what happens if we </a:t>
+            </a:r>
+            <a:r>
+              <a:rPr lang="en-GB" baseline="0" dirty="0" err="1" smtClean="0"/>
+              <a:t>simplifify</a:t>
+            </a:r>
+            <a:r>
+              <a:rPr lang="en-GB" baseline="0" dirty="0" smtClean="0"/>
+              <a:t> the model i.e. disregard the effect of some </a:t>
+            </a:r>
+            <a:r>
+              <a:rPr lang="en-GB" baseline="0" smtClean="0"/>
+              <a:t>parameters from the model.</a:t>
+            </a:r>
+            <a:endParaRPr lang="en-GB" dirty="0"/>
           </a:p>
         </p:txBody>
       </p:sp>
@@ -892,7 +919,7 @@
           <a:p>
             <a:fld id="{0FE4AD66-8E5C-48F9-B0A6-E353D58EB762}" type="slidenum">
               <a:rPr lang="en-US" smtClean="0"/>
-              <a:t>6</a:t>
+              <a:t>5</a:t>
             </a:fld>
             <a:endParaRPr lang="en-US"/>
           </a:p>
@@ -901,7 +928,7 @@
     </p:spTree>
     <p:extLst>
       <p:ext uri="{BB962C8B-B14F-4D97-AF65-F5344CB8AC3E}">
-        <p14:creationId xmlns:p14="http://schemas.microsoft.com/office/powerpoint/2010/main" val="1208198564"/>
+        <p14:creationId xmlns:p14="http://schemas.microsoft.com/office/powerpoint/2010/main" val="1928663785"/>
       </p:ext>
     </p:extLst>
   </p:cSld>
@@ -957,15 +984,28 @@
           <a:p>
             <a:r>
               <a:rPr lang="en-US" dirty="0" smtClean="0"/>
-              <a:t>We decided to take the execution hit in</a:t>
+              <a:t>Now before</a:t>
             </a:r>
             <a:r>
               <a:rPr lang="en-US" baseline="0" dirty="0" smtClean="0"/>
-              <a:t> exchange to</a:t>
+              <a:t> you think the model has too many hyper parameters let me explain you the physical meaning of the parameters and how we might sensibly set them. </a:t>
+            </a:r>
+          </a:p>
+          <a:p>
+            <a:endParaRPr lang="en-US" baseline="0" dirty="0" smtClean="0"/>
+          </a:p>
+          <a:p>
+            <a:r>
+              <a:rPr lang="en-US" baseline="0" dirty="0" smtClean="0"/>
+              <a:t>Point 5 - </a:t>
             </a:r>
             <a:r>
               <a:rPr lang="en-US" dirty="0" smtClean="0"/>
-              <a:t> this convenience.</a:t>
+              <a:t>Let us assume that two</a:t>
+            </a:r>
+            <a:r>
+              <a:rPr lang="en-US" baseline="0" dirty="0" smtClean="0"/>
+              <a:t> causes have same effect for example earthquake can make you house tremble. Same can happen if a truck hits your house. Now if you know only that you house trembled then you have equal probability of earthquake and a truck hitting your house. But if you know that there was an earthquake the then what is the probability of a truck hitting at the same time? It is much less. So knowledge about one cause explains away the effect. Here is a similar thing happening. If a node is connected to many different nodes its influence gets washed away.</a:t>
             </a:r>
             <a:endParaRPr lang="en-US" dirty="0"/>
           </a:p>
@@ -997,7 +1037,7 @@
     </p:spTree>
     <p:extLst>
       <p:ext uri="{BB962C8B-B14F-4D97-AF65-F5344CB8AC3E}">
-        <p14:creationId xmlns:p14="http://schemas.microsoft.com/office/powerpoint/2010/main" val="1208198564"/>
+        <p14:creationId xmlns:p14="http://schemas.microsoft.com/office/powerpoint/2010/main" val="4200700982"/>
       </p:ext>
     </p:extLst>
   </p:cSld>
@@ -1051,6 +1091,198 @@
           <a:bodyPr/>
           <a:lstStyle/>
           <a:p>
+            <a:r>
+              <a:rPr lang="en-US" dirty="0" smtClean="0"/>
+              <a:t>We decided to take the execution hit in</a:t>
+            </a:r>
+            <a:r>
+              <a:rPr lang="en-US" baseline="0" dirty="0" smtClean="0"/>
+              <a:t> exchange to</a:t>
+            </a:r>
+            <a:r>
+              <a:rPr lang="en-US" dirty="0" smtClean="0"/>
+              <a:t> this convenience.</a:t>
+            </a:r>
+            <a:endParaRPr lang="en-US" dirty="0"/>
+          </a:p>
+        </p:txBody>
+      </p:sp>
+      <p:sp>
+        <p:nvSpPr>
+          <p:cNvPr id="4" name="Slide Number Placeholder 3"/>
+          <p:cNvSpPr>
+            <a:spLocks noGrp="1"/>
+          </p:cNvSpPr>
+          <p:nvPr>
+            <p:ph type="sldNum" sz="quarter" idx="10"/>
+          </p:nvPr>
+        </p:nvSpPr>
+        <p:spPr/>
+        <p:txBody>
+          <a:bodyPr/>
+          <a:lstStyle/>
+          <a:p>
+            <a:fld id="{0FE4AD66-8E5C-48F9-B0A6-E353D58EB762}" type="slidenum">
+              <a:rPr lang="en-US" smtClean="0"/>
+              <a:t>8</a:t>
+            </a:fld>
+            <a:endParaRPr lang="en-US"/>
+          </a:p>
+        </p:txBody>
+      </p:sp>
+    </p:spTree>
+    <p:extLst>
+      <p:ext uri="{BB962C8B-B14F-4D97-AF65-F5344CB8AC3E}">
+        <p14:creationId xmlns:p14="http://schemas.microsoft.com/office/powerpoint/2010/main" val="1208198564"/>
+      </p:ext>
+    </p:extLst>
+  </p:cSld>
+  <p:clrMapOvr>
+    <a:masterClrMapping/>
+  </p:clrMapOvr>
+</p:notes>
+</file>
+
+<file path=ppt/notesSlides/notesSlide7.xml><?xml version="1.0" encoding="utf-8"?>
+<p:notes xmlns:a="http://schemas.openxmlformats.org/drawingml/2006/main" xmlns:r="http://schemas.openxmlformats.org/officeDocument/2006/relationships" xmlns:p="http://schemas.openxmlformats.org/presentationml/2006/main">
+  <p:cSld>
+    <p:spTree>
+      <p:nvGrpSpPr>
+        <p:cNvPr id="1" name=""/>
+        <p:cNvGrpSpPr/>
+        <p:nvPr/>
+      </p:nvGrpSpPr>
+      <p:grpSpPr>
+        <a:xfrm>
+          <a:off x="0" y="0"/>
+          <a:ext cx="0" cy="0"/>
+          <a:chOff x="0" y="0"/>
+          <a:chExt cx="0" cy="0"/>
+        </a:xfrm>
+      </p:grpSpPr>
+      <p:sp>
+        <p:nvSpPr>
+          <p:cNvPr id="2" name="Slide Image Placeholder 1"/>
+          <p:cNvSpPr>
+            <a:spLocks noGrp="1" noRot="1" noChangeAspect="1"/>
+          </p:cNvSpPr>
+          <p:nvPr>
+            <p:ph type="sldImg"/>
+          </p:nvPr>
+        </p:nvSpPr>
+        <p:spPr/>
+      </p:sp>
+      <p:sp>
+        <p:nvSpPr>
+          <p:cNvPr id="3" name="Notes Placeholder 2"/>
+          <p:cNvSpPr>
+            <a:spLocks noGrp="1"/>
+          </p:cNvSpPr>
+          <p:nvPr>
+            <p:ph type="body" idx="1"/>
+          </p:nvPr>
+        </p:nvSpPr>
+        <p:spPr/>
+        <p:txBody>
+          <a:bodyPr/>
+          <a:lstStyle/>
+          <a:p>
+            <a:r>
+              <a:rPr lang="en-US" dirty="0" smtClean="0"/>
+              <a:t>We decided to take the execution hit in</a:t>
+            </a:r>
+            <a:r>
+              <a:rPr lang="en-US" baseline="0" dirty="0" smtClean="0"/>
+              <a:t> exchange to</a:t>
+            </a:r>
+            <a:r>
+              <a:rPr lang="en-US" dirty="0" smtClean="0"/>
+              <a:t> this convenience.</a:t>
+            </a:r>
+            <a:endParaRPr lang="en-US" dirty="0"/>
+          </a:p>
+        </p:txBody>
+      </p:sp>
+      <p:sp>
+        <p:nvSpPr>
+          <p:cNvPr id="4" name="Slide Number Placeholder 3"/>
+          <p:cNvSpPr>
+            <a:spLocks noGrp="1"/>
+          </p:cNvSpPr>
+          <p:nvPr>
+            <p:ph type="sldNum" sz="quarter" idx="10"/>
+          </p:nvPr>
+        </p:nvSpPr>
+        <p:spPr/>
+        <p:txBody>
+          <a:bodyPr/>
+          <a:lstStyle/>
+          <a:p>
+            <a:fld id="{0FE4AD66-8E5C-48F9-B0A6-E353D58EB762}" type="slidenum">
+              <a:rPr lang="en-US" smtClean="0"/>
+              <a:t>9</a:t>
+            </a:fld>
+            <a:endParaRPr lang="en-US"/>
+          </a:p>
+        </p:txBody>
+      </p:sp>
+    </p:spTree>
+    <p:extLst>
+      <p:ext uri="{BB962C8B-B14F-4D97-AF65-F5344CB8AC3E}">
+        <p14:creationId xmlns:p14="http://schemas.microsoft.com/office/powerpoint/2010/main" val="1208198564"/>
+      </p:ext>
+    </p:extLst>
+  </p:cSld>
+  <p:clrMapOvr>
+    <a:masterClrMapping/>
+  </p:clrMapOvr>
+</p:notes>
+</file>
+
+<file path=ppt/notesSlides/notesSlide8.xml><?xml version="1.0" encoding="utf-8"?>
+<p:notes xmlns:a="http://schemas.openxmlformats.org/drawingml/2006/main" xmlns:r="http://schemas.openxmlformats.org/officeDocument/2006/relationships" xmlns:p="http://schemas.openxmlformats.org/presentationml/2006/main">
+  <p:cSld>
+    <p:spTree>
+      <p:nvGrpSpPr>
+        <p:cNvPr id="1" name=""/>
+        <p:cNvGrpSpPr/>
+        <p:nvPr/>
+      </p:nvGrpSpPr>
+      <p:grpSpPr>
+        <a:xfrm>
+          <a:off x="0" y="0"/>
+          <a:ext cx="0" cy="0"/>
+          <a:chOff x="0" y="0"/>
+          <a:chExt cx="0" cy="0"/>
+        </a:xfrm>
+      </p:grpSpPr>
+      <p:sp>
+        <p:nvSpPr>
+          <p:cNvPr id="2" name="Slide Image Placeholder 1"/>
+          <p:cNvSpPr>
+            <a:spLocks noGrp="1" noRot="1" noChangeAspect="1"/>
+          </p:cNvSpPr>
+          <p:nvPr>
+            <p:ph type="sldImg"/>
+          </p:nvPr>
+        </p:nvSpPr>
+        <p:spPr/>
+      </p:sp>
+      <p:sp>
+        <p:nvSpPr>
+          <p:cNvPr id="3" name="Notes Placeholder 2"/>
+          <p:cNvSpPr>
+            <a:spLocks noGrp="1"/>
+          </p:cNvSpPr>
+          <p:nvPr>
+            <p:ph type="body" idx="1"/>
+          </p:nvPr>
+        </p:nvSpPr>
+        <p:spPr/>
+        <p:txBody>
+          <a:bodyPr/>
+          <a:lstStyle/>
+          <a:p>
             <a:pPr marL="0" marR="0" indent="0" algn="l" defTabSz="914400" rtl="0" eaLnBrk="1" fontAlgn="auto" latinLnBrk="0" hangingPunct="1">
               <a:lnSpc>
                 <a:spcPct val="100000"/>
@@ -1095,7 +1327,7 @@
           <a:p>
             <a:fld id="{0FE4AD66-8E5C-48F9-B0A6-E353D58EB762}" type="slidenum">
               <a:rPr lang="en-US" smtClean="0"/>
-              <a:t>13</a:t>
+              <a:t>15</a:t>
             </a:fld>
             <a:endParaRPr lang="en-US"/>
           </a:p>
@@ -1340,7 +1572,7 @@
           <a:p>
             <a:fld id="{DE87C573-6297-7F47-AFD3-756D08C72035}" type="datetimeFigureOut">
               <a:rPr lang="en-US" smtClean="0"/>
-              <a:t>12/14/15</a:t>
+              <a:t>12/15/2015</a:t>
             </a:fld>
             <a:endParaRPr lang="en-US"/>
           </a:p>
@@ -1548,7 +1780,7 @@
           <a:p>
             <a:fld id="{DE87C573-6297-7F47-AFD3-756D08C72035}" type="datetimeFigureOut">
               <a:rPr lang="en-US" smtClean="0"/>
-              <a:t>12/14/15</a:t>
+              <a:t>12/15/2015</a:t>
             </a:fld>
             <a:endParaRPr lang="en-US"/>
           </a:p>
@@ -1804,7 +2036,7 @@
           <a:p>
             <a:fld id="{DE87C573-6297-7F47-AFD3-756D08C72035}" type="datetimeFigureOut">
               <a:rPr lang="en-US" smtClean="0"/>
-              <a:t>12/14/15</a:t>
+              <a:t>12/15/2015</a:t>
             </a:fld>
             <a:endParaRPr lang="en-US"/>
           </a:p>
@@ -1974,7 +2206,7 @@
           <a:p>
             <a:fld id="{DE87C573-6297-7F47-AFD3-756D08C72035}" type="datetimeFigureOut">
               <a:rPr lang="en-US" smtClean="0"/>
-              <a:t>12/14/15</a:t>
+              <a:t>12/15/2015</a:t>
             </a:fld>
             <a:endParaRPr lang="en-US"/>
           </a:p>
@@ -2317,7 +2549,7 @@
           <a:p>
             <a:fld id="{DE87C573-6297-7F47-AFD3-756D08C72035}" type="datetimeFigureOut">
               <a:rPr lang="en-US" smtClean="0"/>
-              <a:t>12/14/15</a:t>
+              <a:t>12/15/2015</a:t>
             </a:fld>
             <a:endParaRPr lang="en-US"/>
           </a:p>
@@ -2592,7 +2824,7 @@
           <a:p>
             <a:fld id="{DE87C573-6297-7F47-AFD3-756D08C72035}" type="datetimeFigureOut">
               <a:rPr lang="en-US" smtClean="0"/>
-              <a:t>12/14/15</a:t>
+              <a:t>12/15/2015</a:t>
             </a:fld>
             <a:endParaRPr lang="en-US"/>
           </a:p>
@@ -2971,7 +3203,7 @@
           <a:p>
             <a:fld id="{DE87C573-6297-7F47-AFD3-756D08C72035}" type="datetimeFigureOut">
               <a:rPr lang="en-US" smtClean="0"/>
-              <a:t>12/14/15</a:t>
+              <a:t>12/15/2015</a:t>
             </a:fld>
             <a:endParaRPr lang="en-US"/>
           </a:p>
@@ -3089,7 +3321,7 @@
           <a:p>
             <a:fld id="{DE87C573-6297-7F47-AFD3-756D08C72035}" type="datetimeFigureOut">
               <a:rPr lang="en-US" smtClean="0"/>
-              <a:t>12/14/15</a:t>
+              <a:t>12/15/2015</a:t>
             </a:fld>
             <a:endParaRPr lang="en-US"/>
           </a:p>
@@ -3260,7 +3492,7 @@
           <a:p>
             <a:fld id="{DE87C573-6297-7F47-AFD3-756D08C72035}" type="datetimeFigureOut">
               <a:rPr lang="en-US" smtClean="0"/>
-              <a:t>12/14/15</a:t>
+              <a:t>12/15/2015</a:t>
             </a:fld>
             <a:endParaRPr lang="en-US"/>
           </a:p>
@@ -3614,7 +3846,7 @@
           <a:p>
             <a:fld id="{DE87C573-6297-7F47-AFD3-756D08C72035}" type="datetimeFigureOut">
               <a:rPr lang="en-US" smtClean="0"/>
-              <a:t>12/14/15</a:t>
+              <a:t>12/15/2015</a:t>
             </a:fld>
             <a:endParaRPr lang="en-US"/>
           </a:p>
@@ -3996,7 +4228,7 @@
           <a:p>
             <a:fld id="{DE87C573-6297-7F47-AFD3-756D08C72035}" type="datetimeFigureOut">
               <a:rPr lang="en-US" smtClean="0"/>
-              <a:t>12/14/15</a:t>
+              <a:t>12/15/2015</a:t>
             </a:fld>
             <a:endParaRPr lang="en-US"/>
           </a:p>
@@ -4283,7 +4515,7 @@
           <a:p>
             <a:fld id="{DE87C573-6297-7F47-AFD3-756D08C72035}" type="datetimeFigureOut">
               <a:rPr lang="en-US" smtClean="0"/>
-              <a:t>12/14/15</a:t>
+              <a:t>12/15/2015</a:t>
             </a:fld>
             <a:endParaRPr lang="en-US"/>
           </a:p>
@@ -4893,7 +5125,7 @@
   <p:timing>
     <p:tnLst>
       <p:par>
-        <p:cTn xmlns:p14="http://schemas.microsoft.com/office/powerpoint/2010/main" id="1" dur="indefinite" restart="never" nodeType="tmRoot"/>
+        <p:cTn id="1" dur="indefinite" restart="never" nodeType="tmRoot"/>
       </p:par>
     </p:tnLst>
   </p:timing>
@@ -4901,6 +5133,277 @@
 </file>
 
 <file path=ppt/slides/slide10.xml><?xml version="1.0" encoding="utf-8"?>
+<p:sld xmlns:a="http://schemas.openxmlformats.org/drawingml/2006/main" xmlns:r="http://schemas.openxmlformats.org/officeDocument/2006/relationships" xmlns:p="http://schemas.openxmlformats.org/presentationml/2006/main">
+  <p:cSld>
+    <p:spTree>
+      <p:nvGrpSpPr>
+        <p:cNvPr id="1" name=""/>
+        <p:cNvGrpSpPr/>
+        <p:nvPr/>
+      </p:nvGrpSpPr>
+      <p:grpSpPr>
+        <a:xfrm>
+          <a:off x="0" y="0"/>
+          <a:ext cx="0" cy="0"/>
+          <a:chOff x="0" y="0"/>
+          <a:chExt cx="0" cy="0"/>
+        </a:xfrm>
+      </p:grpSpPr>
+      <p:sp>
+        <p:nvSpPr>
+          <p:cNvPr id="2" name="Title 1"/>
+          <p:cNvSpPr>
+            <a:spLocks noGrp="1"/>
+          </p:cNvSpPr>
+          <p:nvPr>
+            <p:ph type="title"/>
+          </p:nvPr>
+        </p:nvSpPr>
+        <p:spPr/>
+        <p:txBody>
+          <a:bodyPr/>
+          <a:lstStyle/>
+          <a:p>
+            <a:r>
+              <a:rPr lang="en-US" dirty="0" smtClean="0"/>
+              <a:t>Results and their interpretations.</a:t>
+            </a:r>
+            <a:endParaRPr lang="en-US" dirty="0"/>
+          </a:p>
+        </p:txBody>
+      </p:sp>
+    </p:spTree>
+    <p:extLst>
+      <p:ext uri="{BB962C8B-B14F-4D97-AF65-F5344CB8AC3E}">
+        <p14:creationId xmlns:p14="http://schemas.microsoft.com/office/powerpoint/2010/main" val="2056232160"/>
+      </p:ext>
+    </p:extLst>
+  </p:cSld>
+  <p:clrMapOvr>
+    <a:masterClrMapping/>
+  </p:clrMapOvr>
+  <p:timing>
+    <p:tnLst>
+      <p:par>
+        <p:cTn id="1" dur="indefinite" restart="never" nodeType="tmRoot"/>
+      </p:par>
+    </p:tnLst>
+  </p:timing>
+</p:sld>
+</file>
+
+<file path=ppt/slides/slide11.xml><?xml version="1.0" encoding="utf-8"?>
+<p:sld xmlns:a="http://schemas.openxmlformats.org/drawingml/2006/main" xmlns:r="http://schemas.openxmlformats.org/officeDocument/2006/relationships" xmlns:p="http://schemas.openxmlformats.org/presentationml/2006/main">
+  <p:cSld>
+    <p:spTree>
+      <p:nvGrpSpPr>
+        <p:cNvPr id="1" name=""/>
+        <p:cNvGrpSpPr/>
+        <p:nvPr/>
+      </p:nvGrpSpPr>
+      <p:grpSpPr>
+        <a:xfrm>
+          <a:off x="0" y="0"/>
+          <a:ext cx="0" cy="0"/>
+          <a:chOff x="0" y="0"/>
+          <a:chExt cx="0" cy="0"/>
+        </a:xfrm>
+      </p:grpSpPr>
+      <p:sp>
+        <p:nvSpPr>
+          <p:cNvPr id="2" name="Title 1"/>
+          <p:cNvSpPr>
+            <a:spLocks noGrp="1"/>
+          </p:cNvSpPr>
+          <p:nvPr>
+            <p:ph type="title"/>
+          </p:nvPr>
+        </p:nvSpPr>
+        <p:spPr/>
+        <p:txBody>
+          <a:bodyPr/>
+          <a:lstStyle/>
+          <a:p>
+            <a:r>
+              <a:rPr lang="en-US" dirty="0" smtClean="0"/>
+              <a:t>Small-world Networks</a:t>
+            </a:r>
+            <a:endParaRPr lang="en-US" dirty="0"/>
+          </a:p>
+        </p:txBody>
+      </p:sp>
+      <p:pic>
+        <p:nvPicPr>
+          <p:cNvPr id="6" name="Content Placeholder 5" descr="Wattson.png"/>
+          <p:cNvPicPr>
+            <a:picLocks noGrp="1" noChangeAspect="1"/>
+          </p:cNvPicPr>
+          <p:nvPr>
+            <p:ph idx="1"/>
+          </p:nvPr>
+        </p:nvPicPr>
+        <p:blipFill rotWithShape="1">
+          <a:blip r:embed="rId2">
+            <a:extLst>
+              <a:ext uri="{28A0092B-C50C-407E-A947-70E740481C1C}">
+                <a14:useLocalDpi xmlns:a14="http://schemas.microsoft.com/office/drawing/2010/main" val="0"/>
+              </a:ext>
+            </a:extLst>
+          </a:blip>
+          <a:srcRect r="37"/>
+          <a:stretch/>
+        </p:blipFill>
+        <p:spPr>
+          <a:xfrm>
+            <a:off x="822960" y="1737361"/>
+            <a:ext cx="5139272" cy="4557656"/>
+          </a:xfrm>
+        </p:spPr>
+      </p:pic>
+      <p:sp>
+        <p:nvSpPr>
+          <p:cNvPr id="3" name="TextBox 2"/>
+          <p:cNvSpPr txBox="1"/>
+          <p:nvPr/>
+        </p:nvSpPr>
+        <p:spPr>
+          <a:xfrm>
+            <a:off x="6165639" y="1808785"/>
+            <a:ext cx="3147015" cy="3416320"/>
+          </a:xfrm>
+          <a:prstGeom prst="rect">
+            <a:avLst/>
+          </a:prstGeom>
+          <a:noFill/>
+        </p:spPr>
+        <p:txBody>
+          <a:bodyPr wrap="none" rtlCol="0">
+            <a:spAutoFit/>
+          </a:bodyPr>
+          <a:lstStyle/>
+          <a:p>
+            <a:pPr>
+              <a:buFont typeface="Wingdings" panose="05000000000000000000" pitchFamily="2" charset="2"/>
+              <a:buChar char="Ø"/>
+            </a:pPr>
+            <a:r>
+              <a:rPr lang="en-US" dirty="0" smtClean="0"/>
+              <a:t>Small world networks created</a:t>
+            </a:r>
+            <a:br>
+              <a:rPr lang="en-US" dirty="0" smtClean="0"/>
+            </a:br>
+            <a:r>
+              <a:rPr lang="en-US" dirty="0" smtClean="0"/>
+              <a:t>with Watts-</a:t>
+            </a:r>
+            <a:r>
+              <a:rPr lang="en-US" dirty="0" err="1" smtClean="0"/>
+              <a:t>Strogatz</a:t>
+            </a:r>
+            <a:r>
+              <a:rPr lang="en-US" dirty="0" smtClean="0"/>
+              <a:t/>
+            </a:r>
+            <a:br>
+              <a:rPr lang="en-US" dirty="0" smtClean="0"/>
+            </a:br>
+            <a:endParaRPr lang="en-US" dirty="0" smtClean="0"/>
+          </a:p>
+          <a:p>
+            <a:pPr>
+              <a:buFont typeface="Wingdings" panose="05000000000000000000" pitchFamily="2" charset="2"/>
+              <a:buChar char="Ø"/>
+            </a:pPr>
+            <a:r>
+              <a:rPr lang="en-US" dirty="0" smtClean="0"/>
+              <a:t>The size is fixed, and average</a:t>
+            </a:r>
+            <a:br>
+              <a:rPr lang="en-US" dirty="0" smtClean="0"/>
+            </a:br>
+            <a:r>
+              <a:rPr lang="en-US" dirty="0" smtClean="0"/>
+              <a:t>node degree is at 2 </a:t>
+            </a:r>
+            <a:br>
+              <a:rPr lang="en-US" dirty="0" smtClean="0"/>
+            </a:br>
+            <a:endParaRPr lang="en-US" dirty="0" smtClean="0"/>
+          </a:p>
+          <a:p>
+            <a:pPr>
+              <a:buFont typeface="Wingdings" panose="05000000000000000000" pitchFamily="2" charset="2"/>
+              <a:buChar char="Ø"/>
+            </a:pPr>
+            <a:r>
+              <a:rPr lang="en-US" dirty="0" smtClean="0"/>
+              <a:t>The beta parameter defines</a:t>
+            </a:r>
+            <a:br>
+              <a:rPr lang="en-US" dirty="0" smtClean="0"/>
+            </a:br>
+            <a:r>
+              <a:rPr lang="en-US" dirty="0" smtClean="0"/>
+              <a:t>the probability of rewiring</a:t>
+            </a:r>
+            <a:br>
+              <a:rPr lang="en-US" dirty="0" smtClean="0"/>
+            </a:br>
+            <a:endParaRPr lang="en-US" dirty="0"/>
+          </a:p>
+          <a:p>
+            <a:pPr>
+              <a:buFont typeface="Wingdings" panose="05000000000000000000" pitchFamily="2" charset="2"/>
+              <a:buChar char="Ø"/>
+            </a:pPr>
+            <a:r>
+              <a:rPr lang="en-US" dirty="0" smtClean="0"/>
+              <a:t>Beta=0 is ideal small-world;</a:t>
+            </a:r>
+            <a:br>
+              <a:rPr lang="en-US" dirty="0" smtClean="0"/>
+            </a:br>
+            <a:r>
+              <a:rPr lang="en-US" dirty="0" smtClean="0"/>
+              <a:t>large beta is random network </a:t>
+            </a:r>
+            <a:endParaRPr lang="en-US" dirty="0"/>
+          </a:p>
+          <a:p>
+            <a:pPr>
+              <a:buFont typeface="Wingdings" panose="05000000000000000000" pitchFamily="2" charset="2"/>
+              <a:buChar char="Ø"/>
+            </a:pPr>
+            <a:endParaRPr lang="en-US" dirty="0">
+              <a:solidFill>
+                <a:srgbClr val="00B050"/>
+              </a:solidFill>
+            </a:endParaRPr>
+          </a:p>
+        </p:txBody>
+      </p:sp>
+    </p:spTree>
+    <p:extLst>
+      <p:ext uri="{BB962C8B-B14F-4D97-AF65-F5344CB8AC3E}">
+        <p14:creationId xmlns:p14="http://schemas.microsoft.com/office/powerpoint/2010/main" val="237490160"/>
+      </p:ext>
+    </p:extLst>
+  </p:cSld>
+  <p:clrMapOvr>
+    <a:masterClrMapping/>
+  </p:clrMapOvr>
+  <p:timing>
+    <p:tnLst>
+      <p:par>
+        <p:cTn id="1" dur="indefinite" restart="never" nodeType="tmRoot"/>
+      </p:par>
+    </p:tnLst>
+  </p:timing>
+</p:sld>
+</file>
+
+<file path=ppt/slides/slide12.xml><?xml version="1.0" encoding="utf-8"?>
 <p:sld xmlns:a="http://schemas.openxmlformats.org/drawingml/2006/main" xmlns:r="http://schemas.openxmlformats.org/officeDocument/2006/relationships" xmlns:p="http://schemas.openxmlformats.org/presentationml/2006/main">
   <p:cSld>
     <p:spTree>
@@ -5096,671 +5599,7 @@
   <p:timing>
     <p:tnLst>
       <p:par>
-        <p:cTn xmlns:p14="http://schemas.microsoft.com/office/powerpoint/2010/main" id="1" dur="indefinite" restart="never" nodeType="tmRoot"/>
-      </p:par>
-    </p:tnLst>
-  </p:timing>
-</p:sld>
-</file>
-
-<file path=ppt/slides/slide11.xml><?xml version="1.0" encoding="utf-8"?>
-<p:sld xmlns:a="http://schemas.openxmlformats.org/drawingml/2006/main" xmlns:r="http://schemas.openxmlformats.org/officeDocument/2006/relationships" xmlns:p="http://schemas.openxmlformats.org/presentationml/2006/main">
-  <p:cSld>
-    <p:spTree>
-      <p:nvGrpSpPr>
-        <p:cNvPr id="1" name=""/>
-        <p:cNvGrpSpPr/>
-        <p:nvPr/>
-      </p:nvGrpSpPr>
-      <p:grpSpPr>
-        <a:xfrm>
-          <a:off x="0" y="0"/>
-          <a:ext cx="0" cy="0"/>
-          <a:chOff x="0" y="0"/>
-          <a:chExt cx="0" cy="0"/>
-        </a:xfrm>
-      </p:grpSpPr>
-      <p:sp>
-        <p:nvSpPr>
-          <p:cNvPr id="2" name="Title 1"/>
-          <p:cNvSpPr>
-            <a:spLocks noGrp="1"/>
-          </p:cNvSpPr>
-          <p:nvPr>
-            <p:ph type="title"/>
-          </p:nvPr>
-        </p:nvSpPr>
-        <p:spPr/>
-        <p:txBody>
-          <a:bodyPr/>
-          <a:lstStyle/>
-          <a:p>
-            <a:r>
-              <a:rPr lang="en-US" dirty="0" smtClean="0"/>
-              <a:t>Average Node Health </a:t>
-            </a:r>
-            <a:endParaRPr lang="en-US" dirty="0"/>
-          </a:p>
-        </p:txBody>
-      </p:sp>
-      <p:sp>
-        <p:nvSpPr>
-          <p:cNvPr id="3" name="TextBox 2"/>
-          <p:cNvSpPr txBox="1"/>
-          <p:nvPr/>
-        </p:nvSpPr>
-        <p:spPr>
-          <a:xfrm>
-            <a:off x="5927826" y="1737361"/>
-            <a:ext cx="3429144" cy="3139321"/>
-          </a:xfrm>
-          <a:prstGeom prst="rect">
-            <a:avLst/>
-          </a:prstGeom>
-          <a:noFill/>
-        </p:spPr>
-        <p:txBody>
-          <a:bodyPr wrap="none" rtlCol="0">
-            <a:spAutoFit/>
-          </a:bodyPr>
-          <a:lstStyle/>
-          <a:p>
-            <a:pPr>
-              <a:buFont typeface="Wingdings" panose="05000000000000000000" pitchFamily="2" charset="2"/>
-              <a:buChar char="Ø"/>
-            </a:pPr>
-            <a:r>
-              <a:rPr lang="en-US" dirty="0" smtClean="0"/>
-              <a:t>Represents the average damage </a:t>
-            </a:r>
-            <a:br>
-              <a:rPr lang="en-US" dirty="0" smtClean="0"/>
-            </a:br>
-            <a:r>
-              <a:rPr lang="en-US" dirty="0" smtClean="0"/>
-              <a:t>for each of the network</a:t>
-            </a:r>
-          </a:p>
-          <a:p>
-            <a:pPr>
-              <a:buFont typeface="Wingdings" panose="05000000000000000000" pitchFamily="2" charset="2"/>
-              <a:buChar char="Ø"/>
-            </a:pPr>
-            <a:endParaRPr lang="en-US" dirty="0" smtClean="0"/>
-          </a:p>
-          <a:p>
-            <a:pPr>
-              <a:buFont typeface="Wingdings" panose="05000000000000000000" pitchFamily="2" charset="2"/>
-              <a:buChar char="Ø"/>
-            </a:pPr>
-            <a:r>
-              <a:rPr lang="en-US" dirty="0"/>
-              <a:t>It is calculated as the area </a:t>
-            </a:r>
-            <a:r>
-              <a:rPr lang="en-US" dirty="0" err="1" smtClean="0"/>
-              <a:t>betw</a:t>
-            </a:r>
-            <a:r>
-              <a:rPr lang="en-US" dirty="0" smtClean="0"/>
-              <a:t>.</a:t>
-            </a:r>
-            <a:r>
-              <a:rPr lang="en-US" dirty="0"/>
-              <a:t/>
-            </a:r>
-            <a:br>
-              <a:rPr lang="en-US" dirty="0"/>
-            </a:br>
-            <a:r>
-              <a:rPr lang="en-US" dirty="0"/>
-              <a:t>two neighboring CPD </a:t>
-            </a:r>
-            <a:r>
-              <a:rPr lang="en-US" dirty="0" smtClean="0"/>
-              <a:t>plot</a:t>
-            </a:r>
-            <a:br>
-              <a:rPr lang="en-US" dirty="0" smtClean="0"/>
-            </a:br>
-            <a:endParaRPr lang="en-US" dirty="0"/>
-          </a:p>
-          <a:p>
-            <a:pPr>
-              <a:buFont typeface="Wingdings" panose="05000000000000000000" pitchFamily="2" charset="2"/>
-              <a:buChar char="Ø"/>
-            </a:pPr>
-            <a:r>
-              <a:rPr lang="en-US" dirty="0" smtClean="0"/>
-              <a:t>Bigger area signifies more </a:t>
-            </a:r>
-            <a:br>
-              <a:rPr lang="en-US" dirty="0" smtClean="0"/>
-            </a:br>
-            <a:r>
-              <a:rPr lang="en-US" dirty="0" smtClean="0"/>
-              <a:t>damage</a:t>
-            </a:r>
-            <a:br>
-              <a:rPr lang="en-US" dirty="0" smtClean="0"/>
-            </a:br>
-            <a:endParaRPr lang="en-US" dirty="0" smtClean="0"/>
-          </a:p>
-          <a:p>
-            <a:pPr>
-              <a:buFont typeface="Wingdings" panose="05000000000000000000" pitchFamily="2" charset="2"/>
-              <a:buChar char="Ø"/>
-            </a:pPr>
-            <a:r>
-              <a:rPr lang="en-US" dirty="0" smtClean="0"/>
-              <a:t>We call this average node health</a:t>
-            </a:r>
-            <a:endParaRPr lang="en-US" dirty="0"/>
-          </a:p>
-          <a:p>
-            <a:pPr>
-              <a:buFont typeface="Wingdings" panose="05000000000000000000" pitchFamily="2" charset="2"/>
-              <a:buChar char="Ø"/>
-            </a:pPr>
-            <a:endParaRPr lang="en-US" dirty="0">
-              <a:solidFill>
-                <a:srgbClr val="00B050"/>
-              </a:solidFill>
-            </a:endParaRPr>
-          </a:p>
-        </p:txBody>
-      </p:sp>
-      <p:pic>
-        <p:nvPicPr>
-          <p:cNvPr id="6" name="Content Placeholder 5" descr="average node health.png"/>
-          <p:cNvPicPr>
-            <a:picLocks noGrp="1" noChangeAspect="1"/>
-          </p:cNvPicPr>
-          <p:nvPr>
-            <p:ph idx="1"/>
-          </p:nvPr>
-        </p:nvPicPr>
-        <p:blipFill rotWithShape="1">
-          <a:blip r:embed="rId2">
-            <a:extLst>
-              <a:ext uri="{28A0092B-C50C-407E-A947-70E740481C1C}">
-                <a14:useLocalDpi xmlns:a14="http://schemas.microsoft.com/office/drawing/2010/main" val="0"/>
-              </a:ext>
-            </a:extLst>
-          </a:blip>
-          <a:srcRect l="-1082" r="-308"/>
-          <a:stretch/>
-        </p:blipFill>
-        <p:spPr>
-          <a:xfrm>
-            <a:off x="605554" y="1737361"/>
-            <a:ext cx="5104866" cy="4349475"/>
-          </a:xfrm>
-        </p:spPr>
-      </p:pic>
-      <p:sp>
-        <p:nvSpPr>
-          <p:cNvPr id="8" name="TextBox 7"/>
-          <p:cNvSpPr txBox="1"/>
-          <p:nvPr/>
-        </p:nvSpPr>
-        <p:spPr>
-          <a:xfrm rot="16200000">
-            <a:off x="-57539" y="2340862"/>
-            <a:ext cx="1484000" cy="276999"/>
-          </a:xfrm>
-          <a:prstGeom prst="rect">
-            <a:avLst/>
-          </a:prstGeom>
-          <a:noFill/>
-        </p:spPr>
-        <p:txBody>
-          <a:bodyPr wrap="none" rtlCol="0">
-            <a:spAutoFit/>
-          </a:bodyPr>
-          <a:lstStyle/>
-          <a:p>
-            <a:r>
-              <a:rPr lang="en-US" sz="1200" dirty="0" smtClean="0"/>
-              <a:t>Average node health</a:t>
-            </a:r>
-            <a:endParaRPr lang="en-US" sz="1200" dirty="0"/>
-          </a:p>
-        </p:txBody>
-      </p:sp>
-      <p:sp>
-        <p:nvSpPr>
-          <p:cNvPr id="9" name="TextBox 8"/>
-          <p:cNvSpPr txBox="1"/>
-          <p:nvPr/>
-        </p:nvSpPr>
-        <p:spPr>
-          <a:xfrm rot="16200000">
-            <a:off x="-57539" y="4656698"/>
-            <a:ext cx="1484000" cy="276999"/>
-          </a:xfrm>
-          <a:prstGeom prst="rect">
-            <a:avLst/>
-          </a:prstGeom>
-          <a:noFill/>
-        </p:spPr>
-        <p:txBody>
-          <a:bodyPr wrap="none" rtlCol="0">
-            <a:spAutoFit/>
-          </a:bodyPr>
-          <a:lstStyle/>
-          <a:p>
-            <a:r>
-              <a:rPr lang="en-US" sz="1200" dirty="0" smtClean="0"/>
-              <a:t>Average node health</a:t>
-            </a:r>
-            <a:endParaRPr lang="en-US" sz="1200" dirty="0"/>
-          </a:p>
-        </p:txBody>
-      </p:sp>
-      <p:sp>
-        <p:nvSpPr>
-          <p:cNvPr id="10" name="TextBox 9"/>
-          <p:cNvSpPr txBox="1"/>
-          <p:nvPr/>
-        </p:nvSpPr>
-        <p:spPr>
-          <a:xfrm rot="16200000">
-            <a:off x="2554486" y="2340862"/>
-            <a:ext cx="1484000" cy="276999"/>
-          </a:xfrm>
-          <a:prstGeom prst="rect">
-            <a:avLst/>
-          </a:prstGeom>
-          <a:noFill/>
-        </p:spPr>
-        <p:txBody>
-          <a:bodyPr wrap="none" rtlCol="0">
-            <a:spAutoFit/>
-          </a:bodyPr>
-          <a:lstStyle/>
-          <a:p>
-            <a:r>
-              <a:rPr lang="en-US" sz="1200" dirty="0" smtClean="0"/>
-              <a:t>Average node health</a:t>
-            </a:r>
-            <a:endParaRPr lang="en-US" sz="1200" dirty="0"/>
-          </a:p>
-        </p:txBody>
-      </p:sp>
-      <p:sp>
-        <p:nvSpPr>
-          <p:cNvPr id="11" name="TextBox 10"/>
-          <p:cNvSpPr txBox="1"/>
-          <p:nvPr/>
-        </p:nvSpPr>
-        <p:spPr>
-          <a:xfrm rot="16200000">
-            <a:off x="2554487" y="4627700"/>
-            <a:ext cx="1484000" cy="276999"/>
-          </a:xfrm>
-          <a:prstGeom prst="rect">
-            <a:avLst/>
-          </a:prstGeom>
-          <a:noFill/>
-        </p:spPr>
-        <p:txBody>
-          <a:bodyPr wrap="none" rtlCol="0">
-            <a:spAutoFit/>
-          </a:bodyPr>
-          <a:lstStyle/>
-          <a:p>
-            <a:r>
-              <a:rPr lang="en-US" sz="1200" dirty="0" smtClean="0"/>
-              <a:t>Average node health</a:t>
-            </a:r>
-            <a:endParaRPr lang="en-US" sz="1200" dirty="0"/>
-          </a:p>
-        </p:txBody>
-      </p:sp>
-      <p:sp>
-        <p:nvSpPr>
-          <p:cNvPr id="12" name="TextBox 11"/>
-          <p:cNvSpPr txBox="1"/>
-          <p:nvPr/>
-        </p:nvSpPr>
-        <p:spPr>
-          <a:xfrm>
-            <a:off x="1562315" y="5673150"/>
-            <a:ext cx="723200" cy="276999"/>
-          </a:xfrm>
-          <a:prstGeom prst="rect">
-            <a:avLst/>
-          </a:prstGeom>
-          <a:noFill/>
-        </p:spPr>
-        <p:txBody>
-          <a:bodyPr wrap="none" rtlCol="0">
-            <a:spAutoFit/>
-          </a:bodyPr>
-          <a:lstStyle/>
-          <a:p>
-            <a:r>
-              <a:rPr lang="en-US" sz="1200" dirty="0" smtClean="0"/>
-              <a:t>iteration</a:t>
-            </a:r>
-            <a:endParaRPr lang="en-US" sz="1200" dirty="0"/>
-          </a:p>
-        </p:txBody>
-      </p:sp>
-      <p:sp>
-        <p:nvSpPr>
-          <p:cNvPr id="13" name="TextBox 12"/>
-          <p:cNvSpPr txBox="1"/>
-          <p:nvPr/>
-        </p:nvSpPr>
-        <p:spPr>
-          <a:xfrm>
-            <a:off x="3968240" y="3446304"/>
-            <a:ext cx="723200" cy="276999"/>
-          </a:xfrm>
-          <a:prstGeom prst="rect">
-            <a:avLst/>
-          </a:prstGeom>
-          <a:noFill/>
-        </p:spPr>
-        <p:txBody>
-          <a:bodyPr wrap="none" rtlCol="0">
-            <a:spAutoFit/>
-          </a:bodyPr>
-          <a:lstStyle/>
-          <a:p>
-            <a:r>
-              <a:rPr lang="en-US" sz="1200" dirty="0" smtClean="0"/>
-              <a:t>iteration</a:t>
-            </a:r>
-            <a:endParaRPr lang="en-US" sz="1200" dirty="0"/>
-          </a:p>
-        </p:txBody>
-      </p:sp>
-      <p:sp>
-        <p:nvSpPr>
-          <p:cNvPr id="14" name="TextBox 13"/>
-          <p:cNvSpPr txBox="1"/>
-          <p:nvPr/>
-        </p:nvSpPr>
-        <p:spPr>
-          <a:xfrm>
-            <a:off x="4176998" y="5656655"/>
-            <a:ext cx="723200" cy="276999"/>
-          </a:xfrm>
-          <a:prstGeom prst="rect">
-            <a:avLst/>
-          </a:prstGeom>
-          <a:noFill/>
-        </p:spPr>
-        <p:txBody>
-          <a:bodyPr wrap="none" rtlCol="0">
-            <a:spAutoFit/>
-          </a:bodyPr>
-          <a:lstStyle/>
-          <a:p>
-            <a:r>
-              <a:rPr lang="en-US" sz="1200" dirty="0" smtClean="0"/>
-              <a:t>iteration</a:t>
-            </a:r>
-            <a:endParaRPr lang="en-US" sz="1200" dirty="0"/>
-          </a:p>
-        </p:txBody>
-      </p:sp>
-      <p:sp>
-        <p:nvSpPr>
-          <p:cNvPr id="15" name="TextBox 14"/>
-          <p:cNvSpPr txBox="1"/>
-          <p:nvPr/>
-        </p:nvSpPr>
-        <p:spPr>
-          <a:xfrm>
-            <a:off x="1562315" y="3446304"/>
-            <a:ext cx="723200" cy="276999"/>
-          </a:xfrm>
-          <a:prstGeom prst="rect">
-            <a:avLst/>
-          </a:prstGeom>
-          <a:noFill/>
-        </p:spPr>
-        <p:txBody>
-          <a:bodyPr wrap="none" rtlCol="0">
-            <a:spAutoFit/>
-          </a:bodyPr>
-          <a:lstStyle/>
-          <a:p>
-            <a:r>
-              <a:rPr lang="en-US" sz="1200" dirty="0" smtClean="0"/>
-              <a:t>iteration</a:t>
-            </a:r>
-            <a:endParaRPr lang="en-US" sz="1200" dirty="0"/>
-          </a:p>
-        </p:txBody>
-      </p:sp>
-    </p:spTree>
-    <p:extLst>
-      <p:ext uri="{BB962C8B-B14F-4D97-AF65-F5344CB8AC3E}">
-        <p14:creationId xmlns:p14="http://schemas.microsoft.com/office/powerpoint/2010/main" val="696914910"/>
-      </p:ext>
-    </p:extLst>
-  </p:cSld>
-  <p:clrMapOvr>
-    <a:masterClrMapping/>
-  </p:clrMapOvr>
-  <p:timing>
-    <p:tnLst>
-      <p:par>
-        <p:cTn xmlns:p14="http://schemas.microsoft.com/office/powerpoint/2010/main" id="1" dur="indefinite" restart="never" nodeType="tmRoot"/>
-      </p:par>
-    </p:tnLst>
-  </p:timing>
-</p:sld>
-</file>
-
-<file path=ppt/slides/slide12.xml><?xml version="1.0" encoding="utf-8"?>
-<p:sld xmlns:a="http://schemas.openxmlformats.org/drawingml/2006/main" xmlns:r="http://schemas.openxmlformats.org/officeDocument/2006/relationships" xmlns:p="http://schemas.openxmlformats.org/presentationml/2006/main">
-  <p:cSld>
-    <p:spTree>
-      <p:nvGrpSpPr>
-        <p:cNvPr id="1" name=""/>
-        <p:cNvGrpSpPr/>
-        <p:nvPr/>
-      </p:nvGrpSpPr>
-      <p:grpSpPr>
-        <a:xfrm>
-          <a:off x="0" y="0"/>
-          <a:ext cx="0" cy="0"/>
-          <a:chOff x="0" y="0"/>
-          <a:chExt cx="0" cy="0"/>
-        </a:xfrm>
-      </p:grpSpPr>
-      <p:sp>
-        <p:nvSpPr>
-          <p:cNvPr id="2" name="Title 1"/>
-          <p:cNvSpPr>
-            <a:spLocks noGrp="1"/>
-          </p:cNvSpPr>
-          <p:nvPr>
-            <p:ph type="title"/>
-          </p:nvPr>
-        </p:nvSpPr>
-        <p:spPr/>
-        <p:txBody>
-          <a:bodyPr/>
-          <a:lstStyle/>
-          <a:p>
-            <a:r>
-              <a:rPr lang="en-US" dirty="0" smtClean="0"/>
-              <a:t>Robustness Metric</a:t>
-            </a:r>
-            <a:endParaRPr lang="en-US" dirty="0"/>
-          </a:p>
-        </p:txBody>
-      </p:sp>
-      <p:pic>
-        <p:nvPicPr>
-          <p:cNvPr id="5" name="Content Placeholder 4" descr="robustness.png"/>
-          <p:cNvPicPr>
-            <a:picLocks noGrp="1" noChangeAspect="1"/>
-          </p:cNvPicPr>
-          <p:nvPr>
-            <p:ph idx="1"/>
-          </p:nvPr>
-        </p:nvPicPr>
-        <p:blipFill rotWithShape="1">
-          <a:blip r:embed="rId2">
-            <a:extLst>
-              <a:ext uri="{28A0092B-C50C-407E-A947-70E740481C1C}">
-                <a14:useLocalDpi xmlns:a14="http://schemas.microsoft.com/office/drawing/2010/main" val="0"/>
-              </a:ext>
-            </a:extLst>
-          </a:blip>
-          <a:srcRect l="1" r="-2954"/>
-          <a:stretch/>
-        </p:blipFill>
-        <p:spPr>
-          <a:xfrm>
-            <a:off x="674513" y="1737361"/>
-            <a:ext cx="5033434" cy="4023360"/>
-          </a:xfrm>
-        </p:spPr>
-      </p:pic>
-      <p:sp>
-        <p:nvSpPr>
-          <p:cNvPr id="7" name="TextBox 6"/>
-          <p:cNvSpPr txBox="1"/>
-          <p:nvPr/>
-        </p:nvSpPr>
-        <p:spPr>
-          <a:xfrm>
-            <a:off x="5727680" y="1818377"/>
-            <a:ext cx="3416320" cy="3970318"/>
-          </a:xfrm>
-          <a:prstGeom prst="rect">
-            <a:avLst/>
-          </a:prstGeom>
-          <a:noFill/>
-        </p:spPr>
-        <p:txBody>
-          <a:bodyPr wrap="none" rtlCol="0">
-            <a:spAutoFit/>
-          </a:bodyPr>
-          <a:lstStyle/>
-          <a:p>
-            <a:pPr>
-              <a:buFont typeface="Wingdings" panose="05000000000000000000" pitchFamily="2" charset="2"/>
-              <a:buChar char="Ø"/>
-            </a:pPr>
-            <a:r>
-              <a:rPr lang="en-US" dirty="0" smtClean="0"/>
-              <a:t>This plot quantifies the </a:t>
-            </a:r>
-            <a:br>
-              <a:rPr lang="en-US" dirty="0" smtClean="0"/>
-            </a:br>
-            <a:r>
-              <a:rPr lang="en-US" dirty="0" smtClean="0"/>
-              <a:t>final robustness metric of network</a:t>
-            </a:r>
-            <a:br>
-              <a:rPr lang="en-US" dirty="0" smtClean="0"/>
-            </a:br>
-            <a:endParaRPr lang="en-US" dirty="0"/>
-          </a:p>
-          <a:p>
-            <a:pPr>
-              <a:buFont typeface="Wingdings" panose="05000000000000000000" pitchFamily="2" charset="2"/>
-              <a:buChar char="Ø"/>
-            </a:pPr>
-            <a:r>
-              <a:rPr lang="en-US" dirty="0" smtClean="0"/>
-              <a:t>It is defined as the average </a:t>
-            </a:r>
-            <a:br>
-              <a:rPr lang="en-US" dirty="0" smtClean="0"/>
-            </a:br>
-            <a:r>
-              <a:rPr lang="en-US" dirty="0" smtClean="0"/>
-              <a:t>of ‘average node health’</a:t>
-            </a:r>
-            <a:br>
-              <a:rPr lang="en-US" dirty="0" smtClean="0"/>
-            </a:br>
-            <a:endParaRPr lang="en-US" dirty="0"/>
-          </a:p>
-          <a:p>
-            <a:pPr>
-              <a:buFont typeface="Wingdings" panose="05000000000000000000" pitchFamily="2" charset="2"/>
-              <a:buChar char="Ø"/>
-            </a:pPr>
-            <a:r>
-              <a:rPr lang="en-US" dirty="0" smtClean="0"/>
-              <a:t>The network with beta=0 is the</a:t>
-            </a:r>
-            <a:br>
-              <a:rPr lang="en-US" dirty="0" smtClean="0"/>
-            </a:br>
-            <a:r>
-              <a:rPr lang="en-US" dirty="0" smtClean="0"/>
-              <a:t>least robust, while beta=1 is </a:t>
-            </a:r>
-            <a:br>
-              <a:rPr lang="en-US" dirty="0" smtClean="0"/>
-            </a:br>
-            <a:r>
-              <a:rPr lang="en-US" dirty="0" smtClean="0"/>
-              <a:t>the most robust; long range</a:t>
-            </a:r>
-            <a:br>
-              <a:rPr lang="en-US" dirty="0" smtClean="0"/>
-            </a:br>
-            <a:r>
-              <a:rPr lang="en-US" dirty="0" smtClean="0"/>
-              <a:t>interaction taking place</a:t>
-            </a:r>
-            <a:br>
-              <a:rPr lang="en-US" dirty="0" smtClean="0"/>
-            </a:br>
-            <a:endParaRPr lang="en-US" dirty="0"/>
-          </a:p>
-          <a:p>
-            <a:r>
-              <a:rPr lang="en-US" dirty="0"/>
-              <a:t/>
-            </a:r>
-            <a:br>
-              <a:rPr lang="en-US" dirty="0"/>
-            </a:br>
-            <a:endParaRPr lang="en-US" dirty="0"/>
-          </a:p>
-          <a:p>
-            <a:pPr>
-              <a:buFont typeface="Wingdings" panose="05000000000000000000" pitchFamily="2" charset="2"/>
-              <a:buChar char="Ø"/>
-            </a:pPr>
-            <a:endParaRPr lang="en-US" dirty="0">
-              <a:solidFill>
-                <a:srgbClr val="00B050"/>
-              </a:solidFill>
-            </a:endParaRPr>
-          </a:p>
-        </p:txBody>
-      </p:sp>
-    </p:spTree>
-    <p:extLst>
-      <p:ext uri="{BB962C8B-B14F-4D97-AF65-F5344CB8AC3E}">
-        <p14:creationId xmlns:p14="http://schemas.microsoft.com/office/powerpoint/2010/main" val="602921650"/>
-      </p:ext>
-    </p:extLst>
-  </p:cSld>
-  <p:clrMapOvr>
-    <a:masterClrMapping/>
-  </p:clrMapOvr>
-  <p:timing>
-    <p:tnLst>
-      <p:par>
-        <p:cTn xmlns:p14="http://schemas.microsoft.com/office/powerpoint/2010/main" id="1" dur="indefinite" restart="never" nodeType="tmRoot"/>
+        <p:cTn id="1" dur="indefinite" restart="never" nodeType="tmRoot"/>
       </p:par>
     </p:tnLst>
   </p:timing>
@@ -5801,6 +5640,670 @@
           <a:p>
             <a:r>
               <a:rPr lang="en-US" dirty="0" smtClean="0"/>
+              <a:t>Average Node Health </a:t>
+            </a:r>
+            <a:endParaRPr lang="en-US" dirty="0"/>
+          </a:p>
+        </p:txBody>
+      </p:sp>
+      <p:sp>
+        <p:nvSpPr>
+          <p:cNvPr id="3" name="TextBox 2"/>
+          <p:cNvSpPr txBox="1"/>
+          <p:nvPr/>
+        </p:nvSpPr>
+        <p:spPr>
+          <a:xfrm>
+            <a:off x="5927826" y="1737361"/>
+            <a:ext cx="3429144" cy="3139321"/>
+          </a:xfrm>
+          <a:prstGeom prst="rect">
+            <a:avLst/>
+          </a:prstGeom>
+          <a:noFill/>
+        </p:spPr>
+        <p:txBody>
+          <a:bodyPr wrap="none" rtlCol="0">
+            <a:spAutoFit/>
+          </a:bodyPr>
+          <a:lstStyle/>
+          <a:p>
+            <a:pPr>
+              <a:buFont typeface="Wingdings" panose="05000000000000000000" pitchFamily="2" charset="2"/>
+              <a:buChar char="Ø"/>
+            </a:pPr>
+            <a:r>
+              <a:rPr lang="en-US" dirty="0" smtClean="0"/>
+              <a:t>Represents the average damage </a:t>
+            </a:r>
+            <a:br>
+              <a:rPr lang="en-US" dirty="0" smtClean="0"/>
+            </a:br>
+            <a:r>
+              <a:rPr lang="en-US" dirty="0" smtClean="0"/>
+              <a:t>for each of the network</a:t>
+            </a:r>
+          </a:p>
+          <a:p>
+            <a:pPr>
+              <a:buFont typeface="Wingdings" panose="05000000000000000000" pitchFamily="2" charset="2"/>
+              <a:buChar char="Ø"/>
+            </a:pPr>
+            <a:endParaRPr lang="en-US" dirty="0" smtClean="0"/>
+          </a:p>
+          <a:p>
+            <a:pPr>
+              <a:buFont typeface="Wingdings" panose="05000000000000000000" pitchFamily="2" charset="2"/>
+              <a:buChar char="Ø"/>
+            </a:pPr>
+            <a:r>
+              <a:rPr lang="en-US" dirty="0"/>
+              <a:t>It is calculated as the area </a:t>
+            </a:r>
+            <a:r>
+              <a:rPr lang="en-US" dirty="0" err="1" smtClean="0"/>
+              <a:t>betw</a:t>
+            </a:r>
+            <a:r>
+              <a:rPr lang="en-US" dirty="0" smtClean="0"/>
+              <a:t>.</a:t>
+            </a:r>
+            <a:r>
+              <a:rPr lang="en-US" dirty="0"/>
+              <a:t/>
+            </a:r>
+            <a:br>
+              <a:rPr lang="en-US" dirty="0"/>
+            </a:br>
+            <a:r>
+              <a:rPr lang="en-US" dirty="0"/>
+              <a:t>two neighboring CPD </a:t>
+            </a:r>
+            <a:r>
+              <a:rPr lang="en-US" dirty="0" smtClean="0"/>
+              <a:t>plot</a:t>
+            </a:r>
+            <a:br>
+              <a:rPr lang="en-US" dirty="0" smtClean="0"/>
+            </a:br>
+            <a:endParaRPr lang="en-US" dirty="0"/>
+          </a:p>
+          <a:p>
+            <a:pPr>
+              <a:buFont typeface="Wingdings" panose="05000000000000000000" pitchFamily="2" charset="2"/>
+              <a:buChar char="Ø"/>
+            </a:pPr>
+            <a:r>
+              <a:rPr lang="en-US" dirty="0" smtClean="0"/>
+              <a:t>Bigger area signifies more </a:t>
+            </a:r>
+            <a:br>
+              <a:rPr lang="en-US" dirty="0" smtClean="0"/>
+            </a:br>
+            <a:r>
+              <a:rPr lang="en-US" dirty="0" smtClean="0"/>
+              <a:t>damage</a:t>
+            </a:r>
+            <a:br>
+              <a:rPr lang="en-US" dirty="0" smtClean="0"/>
+            </a:br>
+            <a:endParaRPr lang="en-US" dirty="0" smtClean="0"/>
+          </a:p>
+          <a:p>
+            <a:pPr>
+              <a:buFont typeface="Wingdings" panose="05000000000000000000" pitchFamily="2" charset="2"/>
+              <a:buChar char="Ø"/>
+            </a:pPr>
+            <a:r>
+              <a:rPr lang="en-US" dirty="0" smtClean="0"/>
+              <a:t>We call this average node health</a:t>
+            </a:r>
+            <a:endParaRPr lang="en-US" dirty="0"/>
+          </a:p>
+          <a:p>
+            <a:pPr>
+              <a:buFont typeface="Wingdings" panose="05000000000000000000" pitchFamily="2" charset="2"/>
+              <a:buChar char="Ø"/>
+            </a:pPr>
+            <a:endParaRPr lang="en-US" dirty="0">
+              <a:solidFill>
+                <a:srgbClr val="00B050"/>
+              </a:solidFill>
+            </a:endParaRPr>
+          </a:p>
+        </p:txBody>
+      </p:sp>
+      <p:pic>
+        <p:nvPicPr>
+          <p:cNvPr id="6" name="Content Placeholder 5" descr="average node health.png"/>
+          <p:cNvPicPr>
+            <a:picLocks noGrp="1" noChangeAspect="1"/>
+          </p:cNvPicPr>
+          <p:nvPr>
+            <p:ph idx="1"/>
+          </p:nvPr>
+        </p:nvPicPr>
+        <p:blipFill rotWithShape="1">
+          <a:blip r:embed="rId2">
+            <a:extLst>
+              <a:ext uri="{28A0092B-C50C-407E-A947-70E740481C1C}">
+                <a14:useLocalDpi xmlns:a14="http://schemas.microsoft.com/office/drawing/2010/main" val="0"/>
+              </a:ext>
+            </a:extLst>
+          </a:blip>
+          <a:srcRect l="-1082" r="-308"/>
+          <a:stretch/>
+        </p:blipFill>
+        <p:spPr>
+          <a:xfrm>
+            <a:off x="605554" y="1737361"/>
+            <a:ext cx="5104866" cy="4349475"/>
+          </a:xfrm>
+        </p:spPr>
+      </p:pic>
+      <p:sp>
+        <p:nvSpPr>
+          <p:cNvPr id="8" name="TextBox 7"/>
+          <p:cNvSpPr txBox="1"/>
+          <p:nvPr/>
+        </p:nvSpPr>
+        <p:spPr>
+          <a:xfrm rot="16200000">
+            <a:off x="-57539" y="2340862"/>
+            <a:ext cx="1484000" cy="276999"/>
+          </a:xfrm>
+          <a:prstGeom prst="rect">
+            <a:avLst/>
+          </a:prstGeom>
+          <a:noFill/>
+        </p:spPr>
+        <p:txBody>
+          <a:bodyPr wrap="none" rtlCol="0">
+            <a:spAutoFit/>
+          </a:bodyPr>
+          <a:lstStyle/>
+          <a:p>
+            <a:r>
+              <a:rPr lang="en-US" sz="1200" dirty="0" smtClean="0"/>
+              <a:t>Average node health</a:t>
+            </a:r>
+            <a:endParaRPr lang="en-US" sz="1200" dirty="0"/>
+          </a:p>
+        </p:txBody>
+      </p:sp>
+      <p:sp>
+        <p:nvSpPr>
+          <p:cNvPr id="9" name="TextBox 8"/>
+          <p:cNvSpPr txBox="1"/>
+          <p:nvPr/>
+        </p:nvSpPr>
+        <p:spPr>
+          <a:xfrm rot="16200000">
+            <a:off x="-57539" y="4656698"/>
+            <a:ext cx="1484000" cy="276999"/>
+          </a:xfrm>
+          <a:prstGeom prst="rect">
+            <a:avLst/>
+          </a:prstGeom>
+          <a:noFill/>
+        </p:spPr>
+        <p:txBody>
+          <a:bodyPr wrap="none" rtlCol="0">
+            <a:spAutoFit/>
+          </a:bodyPr>
+          <a:lstStyle/>
+          <a:p>
+            <a:r>
+              <a:rPr lang="en-US" sz="1200" dirty="0" smtClean="0"/>
+              <a:t>Average node health</a:t>
+            </a:r>
+            <a:endParaRPr lang="en-US" sz="1200" dirty="0"/>
+          </a:p>
+        </p:txBody>
+      </p:sp>
+      <p:sp>
+        <p:nvSpPr>
+          <p:cNvPr id="10" name="TextBox 9"/>
+          <p:cNvSpPr txBox="1"/>
+          <p:nvPr/>
+        </p:nvSpPr>
+        <p:spPr>
+          <a:xfrm rot="16200000">
+            <a:off x="2554486" y="2340862"/>
+            <a:ext cx="1484000" cy="276999"/>
+          </a:xfrm>
+          <a:prstGeom prst="rect">
+            <a:avLst/>
+          </a:prstGeom>
+          <a:noFill/>
+        </p:spPr>
+        <p:txBody>
+          <a:bodyPr wrap="none" rtlCol="0">
+            <a:spAutoFit/>
+          </a:bodyPr>
+          <a:lstStyle/>
+          <a:p>
+            <a:r>
+              <a:rPr lang="en-US" sz="1200" dirty="0" smtClean="0"/>
+              <a:t>Average node health</a:t>
+            </a:r>
+            <a:endParaRPr lang="en-US" sz="1200" dirty="0"/>
+          </a:p>
+        </p:txBody>
+      </p:sp>
+      <p:sp>
+        <p:nvSpPr>
+          <p:cNvPr id="11" name="TextBox 10"/>
+          <p:cNvSpPr txBox="1"/>
+          <p:nvPr/>
+        </p:nvSpPr>
+        <p:spPr>
+          <a:xfrm rot="16200000">
+            <a:off x="2554487" y="4627700"/>
+            <a:ext cx="1484000" cy="276999"/>
+          </a:xfrm>
+          <a:prstGeom prst="rect">
+            <a:avLst/>
+          </a:prstGeom>
+          <a:noFill/>
+        </p:spPr>
+        <p:txBody>
+          <a:bodyPr wrap="none" rtlCol="0">
+            <a:spAutoFit/>
+          </a:bodyPr>
+          <a:lstStyle/>
+          <a:p>
+            <a:r>
+              <a:rPr lang="en-US" sz="1200" dirty="0" smtClean="0"/>
+              <a:t>Average node health</a:t>
+            </a:r>
+            <a:endParaRPr lang="en-US" sz="1200" dirty="0"/>
+          </a:p>
+        </p:txBody>
+      </p:sp>
+      <p:sp>
+        <p:nvSpPr>
+          <p:cNvPr id="12" name="TextBox 11"/>
+          <p:cNvSpPr txBox="1"/>
+          <p:nvPr/>
+        </p:nvSpPr>
+        <p:spPr>
+          <a:xfrm>
+            <a:off x="1562315" y="5673150"/>
+            <a:ext cx="723200" cy="276999"/>
+          </a:xfrm>
+          <a:prstGeom prst="rect">
+            <a:avLst/>
+          </a:prstGeom>
+          <a:noFill/>
+        </p:spPr>
+        <p:txBody>
+          <a:bodyPr wrap="none" rtlCol="0">
+            <a:spAutoFit/>
+          </a:bodyPr>
+          <a:lstStyle/>
+          <a:p>
+            <a:r>
+              <a:rPr lang="en-US" sz="1200" dirty="0" smtClean="0"/>
+              <a:t>iteration</a:t>
+            </a:r>
+            <a:endParaRPr lang="en-US" sz="1200" dirty="0"/>
+          </a:p>
+        </p:txBody>
+      </p:sp>
+      <p:sp>
+        <p:nvSpPr>
+          <p:cNvPr id="13" name="TextBox 12"/>
+          <p:cNvSpPr txBox="1"/>
+          <p:nvPr/>
+        </p:nvSpPr>
+        <p:spPr>
+          <a:xfrm>
+            <a:off x="3968240" y="3446304"/>
+            <a:ext cx="723200" cy="276999"/>
+          </a:xfrm>
+          <a:prstGeom prst="rect">
+            <a:avLst/>
+          </a:prstGeom>
+          <a:noFill/>
+        </p:spPr>
+        <p:txBody>
+          <a:bodyPr wrap="none" rtlCol="0">
+            <a:spAutoFit/>
+          </a:bodyPr>
+          <a:lstStyle/>
+          <a:p>
+            <a:r>
+              <a:rPr lang="en-US" sz="1200" dirty="0" smtClean="0"/>
+              <a:t>iteration</a:t>
+            </a:r>
+            <a:endParaRPr lang="en-US" sz="1200" dirty="0"/>
+          </a:p>
+        </p:txBody>
+      </p:sp>
+      <p:sp>
+        <p:nvSpPr>
+          <p:cNvPr id="14" name="TextBox 13"/>
+          <p:cNvSpPr txBox="1"/>
+          <p:nvPr/>
+        </p:nvSpPr>
+        <p:spPr>
+          <a:xfrm>
+            <a:off x="4176998" y="5656655"/>
+            <a:ext cx="723200" cy="276999"/>
+          </a:xfrm>
+          <a:prstGeom prst="rect">
+            <a:avLst/>
+          </a:prstGeom>
+          <a:noFill/>
+        </p:spPr>
+        <p:txBody>
+          <a:bodyPr wrap="none" rtlCol="0">
+            <a:spAutoFit/>
+          </a:bodyPr>
+          <a:lstStyle/>
+          <a:p>
+            <a:r>
+              <a:rPr lang="en-US" sz="1200" dirty="0" smtClean="0"/>
+              <a:t>iteration</a:t>
+            </a:r>
+            <a:endParaRPr lang="en-US" sz="1200" dirty="0"/>
+          </a:p>
+        </p:txBody>
+      </p:sp>
+      <p:sp>
+        <p:nvSpPr>
+          <p:cNvPr id="15" name="TextBox 14"/>
+          <p:cNvSpPr txBox="1"/>
+          <p:nvPr/>
+        </p:nvSpPr>
+        <p:spPr>
+          <a:xfrm>
+            <a:off x="1562315" y="3446304"/>
+            <a:ext cx="723200" cy="276999"/>
+          </a:xfrm>
+          <a:prstGeom prst="rect">
+            <a:avLst/>
+          </a:prstGeom>
+          <a:noFill/>
+        </p:spPr>
+        <p:txBody>
+          <a:bodyPr wrap="none" rtlCol="0">
+            <a:spAutoFit/>
+          </a:bodyPr>
+          <a:lstStyle/>
+          <a:p>
+            <a:r>
+              <a:rPr lang="en-US" sz="1200" dirty="0" smtClean="0"/>
+              <a:t>iteration</a:t>
+            </a:r>
+            <a:endParaRPr lang="en-US" sz="1200" dirty="0"/>
+          </a:p>
+        </p:txBody>
+      </p:sp>
+    </p:spTree>
+    <p:extLst>
+      <p:ext uri="{BB962C8B-B14F-4D97-AF65-F5344CB8AC3E}">
+        <p14:creationId xmlns:p14="http://schemas.microsoft.com/office/powerpoint/2010/main" val="696914910"/>
+      </p:ext>
+    </p:extLst>
+  </p:cSld>
+  <p:clrMapOvr>
+    <a:masterClrMapping/>
+  </p:clrMapOvr>
+  <p:timing>
+    <p:tnLst>
+      <p:par>
+        <p:cTn id="1" dur="indefinite" restart="never" nodeType="tmRoot"/>
+      </p:par>
+    </p:tnLst>
+  </p:timing>
+</p:sld>
+</file>
+
+<file path=ppt/slides/slide14.xml><?xml version="1.0" encoding="utf-8"?>
+<p:sld xmlns:a="http://schemas.openxmlformats.org/drawingml/2006/main" xmlns:r="http://schemas.openxmlformats.org/officeDocument/2006/relationships" xmlns:p="http://schemas.openxmlformats.org/presentationml/2006/main">
+  <p:cSld>
+    <p:spTree>
+      <p:nvGrpSpPr>
+        <p:cNvPr id="1" name=""/>
+        <p:cNvGrpSpPr/>
+        <p:nvPr/>
+      </p:nvGrpSpPr>
+      <p:grpSpPr>
+        <a:xfrm>
+          <a:off x="0" y="0"/>
+          <a:ext cx="0" cy="0"/>
+          <a:chOff x="0" y="0"/>
+          <a:chExt cx="0" cy="0"/>
+        </a:xfrm>
+      </p:grpSpPr>
+      <p:sp>
+        <p:nvSpPr>
+          <p:cNvPr id="2" name="Title 1"/>
+          <p:cNvSpPr>
+            <a:spLocks noGrp="1"/>
+          </p:cNvSpPr>
+          <p:nvPr>
+            <p:ph type="title"/>
+          </p:nvPr>
+        </p:nvSpPr>
+        <p:spPr/>
+        <p:txBody>
+          <a:bodyPr/>
+          <a:lstStyle/>
+          <a:p>
+            <a:r>
+              <a:rPr lang="en-US" dirty="0" smtClean="0"/>
+              <a:t>Robustness Metric</a:t>
+            </a:r>
+            <a:endParaRPr lang="en-US" dirty="0"/>
+          </a:p>
+        </p:txBody>
+      </p:sp>
+      <p:pic>
+        <p:nvPicPr>
+          <p:cNvPr id="5" name="Content Placeholder 4" descr="robustness.png"/>
+          <p:cNvPicPr>
+            <a:picLocks noGrp="1" noChangeAspect="1"/>
+          </p:cNvPicPr>
+          <p:nvPr>
+            <p:ph idx="1"/>
+          </p:nvPr>
+        </p:nvPicPr>
+        <p:blipFill rotWithShape="1">
+          <a:blip r:embed="rId2">
+            <a:extLst>
+              <a:ext uri="{28A0092B-C50C-407E-A947-70E740481C1C}">
+                <a14:useLocalDpi xmlns:a14="http://schemas.microsoft.com/office/drawing/2010/main" val="0"/>
+              </a:ext>
+            </a:extLst>
+          </a:blip>
+          <a:srcRect l="1" r="-2954"/>
+          <a:stretch/>
+        </p:blipFill>
+        <p:spPr>
+          <a:xfrm>
+            <a:off x="674513" y="1737361"/>
+            <a:ext cx="5033434" cy="4023360"/>
+          </a:xfrm>
+        </p:spPr>
+      </p:pic>
+      <p:sp>
+        <p:nvSpPr>
+          <p:cNvPr id="7" name="TextBox 6"/>
+          <p:cNvSpPr txBox="1"/>
+          <p:nvPr/>
+        </p:nvSpPr>
+        <p:spPr>
+          <a:xfrm>
+            <a:off x="5727680" y="1818377"/>
+            <a:ext cx="3416320" cy="3970318"/>
+          </a:xfrm>
+          <a:prstGeom prst="rect">
+            <a:avLst/>
+          </a:prstGeom>
+          <a:noFill/>
+        </p:spPr>
+        <p:txBody>
+          <a:bodyPr wrap="none" rtlCol="0">
+            <a:spAutoFit/>
+          </a:bodyPr>
+          <a:lstStyle/>
+          <a:p>
+            <a:pPr>
+              <a:buFont typeface="Wingdings" panose="05000000000000000000" pitchFamily="2" charset="2"/>
+              <a:buChar char="Ø"/>
+            </a:pPr>
+            <a:r>
+              <a:rPr lang="en-US" dirty="0" smtClean="0"/>
+              <a:t>This plot quantifies the </a:t>
+            </a:r>
+            <a:br>
+              <a:rPr lang="en-US" dirty="0" smtClean="0"/>
+            </a:br>
+            <a:r>
+              <a:rPr lang="en-US" dirty="0" smtClean="0"/>
+              <a:t>final robustness metric of network</a:t>
+            </a:r>
+            <a:br>
+              <a:rPr lang="en-US" dirty="0" smtClean="0"/>
+            </a:br>
+            <a:endParaRPr lang="en-US" dirty="0"/>
+          </a:p>
+          <a:p>
+            <a:pPr>
+              <a:buFont typeface="Wingdings" panose="05000000000000000000" pitchFamily="2" charset="2"/>
+              <a:buChar char="Ø"/>
+            </a:pPr>
+            <a:r>
+              <a:rPr lang="en-US" dirty="0" smtClean="0"/>
+              <a:t>It is defined as the average </a:t>
+            </a:r>
+            <a:br>
+              <a:rPr lang="en-US" dirty="0" smtClean="0"/>
+            </a:br>
+            <a:r>
+              <a:rPr lang="en-US" dirty="0" smtClean="0"/>
+              <a:t>of ‘average node health’</a:t>
+            </a:r>
+            <a:br>
+              <a:rPr lang="en-US" dirty="0" smtClean="0"/>
+            </a:br>
+            <a:endParaRPr lang="en-US" dirty="0"/>
+          </a:p>
+          <a:p>
+            <a:pPr>
+              <a:buFont typeface="Wingdings" panose="05000000000000000000" pitchFamily="2" charset="2"/>
+              <a:buChar char="Ø"/>
+            </a:pPr>
+            <a:r>
+              <a:rPr lang="en-US" dirty="0" smtClean="0"/>
+              <a:t>The network with beta=0 is the</a:t>
+            </a:r>
+            <a:br>
+              <a:rPr lang="en-US" dirty="0" smtClean="0"/>
+            </a:br>
+            <a:r>
+              <a:rPr lang="en-US" dirty="0" smtClean="0"/>
+              <a:t>least robust, while beta=1 is </a:t>
+            </a:r>
+            <a:br>
+              <a:rPr lang="en-US" dirty="0" smtClean="0"/>
+            </a:br>
+            <a:r>
+              <a:rPr lang="en-US" dirty="0" smtClean="0"/>
+              <a:t>the most robust; long range</a:t>
+            </a:r>
+            <a:br>
+              <a:rPr lang="en-US" dirty="0" smtClean="0"/>
+            </a:br>
+            <a:r>
+              <a:rPr lang="en-US" dirty="0" smtClean="0"/>
+              <a:t>interaction taking place</a:t>
+            </a:r>
+            <a:br>
+              <a:rPr lang="en-US" dirty="0" smtClean="0"/>
+            </a:br>
+            <a:endParaRPr lang="en-US" dirty="0"/>
+          </a:p>
+          <a:p>
+            <a:r>
+              <a:rPr lang="en-US" dirty="0"/>
+              <a:t/>
+            </a:r>
+            <a:br>
+              <a:rPr lang="en-US" dirty="0"/>
+            </a:br>
+            <a:endParaRPr lang="en-US" dirty="0"/>
+          </a:p>
+          <a:p>
+            <a:pPr>
+              <a:buFont typeface="Wingdings" panose="05000000000000000000" pitchFamily="2" charset="2"/>
+              <a:buChar char="Ø"/>
+            </a:pPr>
+            <a:endParaRPr lang="en-US" dirty="0">
+              <a:solidFill>
+                <a:srgbClr val="00B050"/>
+              </a:solidFill>
+            </a:endParaRPr>
+          </a:p>
+        </p:txBody>
+      </p:sp>
+    </p:spTree>
+    <p:extLst>
+      <p:ext uri="{BB962C8B-B14F-4D97-AF65-F5344CB8AC3E}">
+        <p14:creationId xmlns:p14="http://schemas.microsoft.com/office/powerpoint/2010/main" val="602921650"/>
+      </p:ext>
+    </p:extLst>
+  </p:cSld>
+  <p:clrMapOvr>
+    <a:masterClrMapping/>
+  </p:clrMapOvr>
+  <p:timing>
+    <p:tnLst>
+      <p:par>
+        <p:cTn id="1" dur="indefinite" restart="never" nodeType="tmRoot"/>
+      </p:par>
+    </p:tnLst>
+  </p:timing>
+</p:sld>
+</file>
+
+<file path=ppt/slides/slide15.xml><?xml version="1.0" encoding="utf-8"?>
+<p:sld xmlns:a="http://schemas.openxmlformats.org/drawingml/2006/main" xmlns:r="http://schemas.openxmlformats.org/officeDocument/2006/relationships" xmlns:p="http://schemas.openxmlformats.org/presentationml/2006/main">
+  <p:cSld>
+    <p:spTree>
+      <p:nvGrpSpPr>
+        <p:cNvPr id="1" name=""/>
+        <p:cNvGrpSpPr/>
+        <p:nvPr/>
+      </p:nvGrpSpPr>
+      <p:grpSpPr>
+        <a:xfrm>
+          <a:off x="0" y="0"/>
+          <a:ext cx="0" cy="0"/>
+          <a:chOff x="0" y="0"/>
+          <a:chExt cx="0" cy="0"/>
+        </a:xfrm>
+      </p:grpSpPr>
+      <p:sp>
+        <p:nvSpPr>
+          <p:cNvPr id="2" name="Title 1"/>
+          <p:cNvSpPr>
+            <a:spLocks noGrp="1"/>
+          </p:cNvSpPr>
+          <p:nvPr>
+            <p:ph type="title"/>
+          </p:nvPr>
+        </p:nvSpPr>
+        <p:spPr/>
+        <p:txBody>
+          <a:bodyPr/>
+          <a:lstStyle/>
+          <a:p>
+            <a:r>
+              <a:rPr lang="en-US" dirty="0" smtClean="0"/>
               <a:t>Conclusion</a:t>
             </a:r>
             <a:endParaRPr lang="en-US" dirty="0"/>
@@ -5906,7 +6409,7 @@
   <p:timing>
     <p:tnLst>
       <p:par>
-        <p:cTn xmlns:p14="http://schemas.microsoft.com/office/powerpoint/2010/main" id="1" dur="indefinite" restart="never" nodeType="tmRoot"/>
+        <p:cTn id="1" dur="indefinite" restart="never" nodeType="tmRoot"/>
       </p:par>
     </p:tnLst>
   </p:timing>
@@ -6094,7 +6597,7 @@
   <p:timing>
     <p:tnLst>
       <p:par>
-        <p:cTn xmlns:p14="http://schemas.microsoft.com/office/powerpoint/2010/main" id="1" dur="indefinite" restart="never" nodeType="tmRoot">
+        <p:cTn id="1" dur="indefinite" restart="never" nodeType="tmRoot">
           <p:childTnLst>
             <p:seq concurrent="1" nextAc="seek">
               <p:cTn id="2" dur="indefinite" nodeType="mainSeq">
@@ -6904,7 +7407,7 @@
   <p:timing>
     <p:tnLst>
       <p:par>
-        <p:cTn xmlns:p14="http://schemas.microsoft.com/office/powerpoint/2010/main" id="1" dur="indefinite" restart="never" nodeType="tmRoot">
+        <p:cTn id="1" dur="indefinite" restart="never" nodeType="tmRoot">
           <p:childTnLst>
             <p:seq concurrent="1" nextAc="seek">
               <p:cTn id="2" dur="indefinite" nodeType="mainSeq">
@@ -7358,6 +7861,257 @@
           <a:lstStyle/>
           <a:p>
             <a:r>
+              <a:rPr lang="en-GB" dirty="0" smtClean="0"/>
+              <a:t>Relevant Works</a:t>
+            </a:r>
+            <a:endParaRPr lang="en-GB" dirty="0"/>
+          </a:p>
+        </p:txBody>
+      </p:sp>
+      <p:sp>
+        <p:nvSpPr>
+          <p:cNvPr id="3" name="Content Placeholder 2"/>
+          <p:cNvSpPr>
+            <a:spLocks noGrp="1"/>
+          </p:cNvSpPr>
+          <p:nvPr>
+            <p:ph idx="1"/>
+          </p:nvPr>
+        </p:nvSpPr>
+        <p:spPr/>
+        <p:txBody>
+          <a:bodyPr/>
+          <a:lstStyle/>
+          <a:p>
+            <a:pPr>
+              <a:buFont typeface="Wingdings" panose="05000000000000000000" pitchFamily="2" charset="2"/>
+              <a:buChar char="Ø"/>
+            </a:pPr>
+            <a:r>
+              <a:rPr lang="en-GB" dirty="0" smtClean="0"/>
+              <a:t>Epidemic Theory</a:t>
+            </a:r>
+          </a:p>
+          <a:p>
+            <a:pPr lvl="1">
+              <a:buFont typeface="Wingdings" panose="05000000000000000000" pitchFamily="2" charset="2"/>
+              <a:buChar char="Ø"/>
+            </a:pPr>
+            <a:r>
+              <a:rPr lang="en-GB" dirty="0" smtClean="0"/>
+              <a:t>Susceptible-Infected-Recovered (SIR) Model</a:t>
+            </a:r>
+          </a:p>
+          <a:p>
+            <a:pPr lvl="1">
+              <a:buFont typeface="Wingdings" panose="05000000000000000000" pitchFamily="2" charset="2"/>
+              <a:buChar char="Ø"/>
+            </a:pPr>
+            <a:r>
+              <a:rPr lang="en-GB" dirty="0" smtClean="0"/>
+              <a:t>Susceptible-Infectious-Susceptible (SIS) Model</a:t>
+            </a:r>
+          </a:p>
+          <a:p>
+            <a:pPr>
+              <a:buFont typeface="Wingdings" panose="05000000000000000000" pitchFamily="2" charset="2"/>
+              <a:buChar char="Ø"/>
+            </a:pPr>
+            <a:r>
+              <a:rPr lang="en-GB" dirty="0" smtClean="0"/>
+              <a:t>Network Theory Model</a:t>
+            </a:r>
+            <a:endParaRPr lang="en-GB" dirty="0"/>
+          </a:p>
+          <a:p>
+            <a:pPr lvl="1">
+              <a:buFont typeface="Wingdings" panose="05000000000000000000" pitchFamily="2" charset="2"/>
+              <a:buChar char="Ø"/>
+            </a:pPr>
+            <a:r>
+              <a:rPr lang="en-GB" dirty="0" smtClean="0"/>
+              <a:t>Models based on simulation mechanism:</a:t>
+            </a:r>
+          </a:p>
+          <a:p>
+            <a:pPr lvl="2">
+              <a:buFont typeface="Wingdings" panose="05000000000000000000" pitchFamily="2" charset="2"/>
+              <a:buChar char="Ø"/>
+            </a:pPr>
+            <a:r>
+              <a:rPr lang="en-GB" dirty="0" smtClean="0"/>
+              <a:t>Rate of Infection = Transmission Rate * Number of Infected Neighbours</a:t>
+            </a:r>
+          </a:p>
+          <a:p>
+            <a:pPr lvl="2">
+              <a:buFont typeface="Wingdings" panose="05000000000000000000" pitchFamily="2" charset="2"/>
+              <a:buChar char="Ø"/>
+            </a:pPr>
+            <a:r>
+              <a:rPr lang="en-GB" dirty="0" smtClean="0"/>
+              <a:t>Probabilistic Spread of Infection</a:t>
+            </a:r>
+          </a:p>
+          <a:p>
+            <a:pPr lvl="1">
+              <a:buFont typeface="Wingdings" panose="05000000000000000000" pitchFamily="2" charset="2"/>
+              <a:buChar char="Ø"/>
+            </a:pPr>
+            <a:endParaRPr lang="en-GB" dirty="0"/>
+          </a:p>
+        </p:txBody>
+      </p:sp>
+    </p:spTree>
+    <p:extLst>
+      <p:ext uri="{BB962C8B-B14F-4D97-AF65-F5344CB8AC3E}">
+        <p14:creationId xmlns:p14="http://schemas.microsoft.com/office/powerpoint/2010/main" val="3471722688"/>
+      </p:ext>
+    </p:extLst>
+  </p:cSld>
+  <p:clrMapOvr>
+    <a:masterClrMapping/>
+  </p:clrMapOvr>
+  <p:timing>
+    <p:tnLst>
+      <p:par>
+        <p:cTn id="1" dur="indefinite" restart="never" nodeType="tmRoot"/>
+      </p:par>
+    </p:tnLst>
+  </p:timing>
+</p:sld>
+</file>
+
+<file path=ppt/slides/slide5.xml><?xml version="1.0" encoding="utf-8"?>
+<p:sld xmlns:a="http://schemas.openxmlformats.org/drawingml/2006/main" xmlns:r="http://schemas.openxmlformats.org/officeDocument/2006/relationships" xmlns:p="http://schemas.openxmlformats.org/presentationml/2006/main">
+  <p:cSld>
+    <p:spTree>
+      <p:nvGrpSpPr>
+        <p:cNvPr id="1" name=""/>
+        <p:cNvGrpSpPr/>
+        <p:nvPr/>
+      </p:nvGrpSpPr>
+      <p:grpSpPr>
+        <a:xfrm>
+          <a:off x="0" y="0"/>
+          <a:ext cx="0" cy="0"/>
+          <a:chOff x="0" y="0"/>
+          <a:chExt cx="0" cy="0"/>
+        </a:xfrm>
+      </p:grpSpPr>
+      <p:sp>
+        <p:nvSpPr>
+          <p:cNvPr id="2" name="Title 1"/>
+          <p:cNvSpPr>
+            <a:spLocks noGrp="1"/>
+          </p:cNvSpPr>
+          <p:nvPr>
+            <p:ph type="title"/>
+          </p:nvPr>
+        </p:nvSpPr>
+        <p:spPr/>
+        <p:txBody>
+          <a:bodyPr/>
+          <a:lstStyle/>
+          <a:p>
+            <a:r>
+              <a:rPr lang="en-GB" dirty="0" smtClean="0"/>
+              <a:t>Research Problem</a:t>
+            </a:r>
+            <a:endParaRPr lang="en-GB" dirty="0"/>
+          </a:p>
+        </p:txBody>
+      </p:sp>
+      <p:sp>
+        <p:nvSpPr>
+          <p:cNvPr id="3" name="Content Placeholder 2"/>
+          <p:cNvSpPr>
+            <a:spLocks noGrp="1"/>
+          </p:cNvSpPr>
+          <p:nvPr>
+            <p:ph idx="1"/>
+          </p:nvPr>
+        </p:nvSpPr>
+        <p:spPr/>
+        <p:txBody>
+          <a:bodyPr/>
+          <a:lstStyle/>
+          <a:p>
+            <a:pPr>
+              <a:buFont typeface="Wingdings" panose="05000000000000000000" pitchFamily="2" charset="2"/>
+              <a:buChar char="Ø"/>
+            </a:pPr>
+            <a:r>
+              <a:rPr lang="en-GB" dirty="0" smtClean="0"/>
+              <a:t>Determine Robustness of Randomly Generated Graphs</a:t>
+            </a:r>
+          </a:p>
+          <a:p>
+            <a:pPr>
+              <a:buFont typeface="Wingdings" panose="05000000000000000000" pitchFamily="2" charset="2"/>
+              <a:buChar char="Ø"/>
+            </a:pPr>
+            <a:r>
+              <a:rPr lang="en-GB" dirty="0" smtClean="0"/>
+              <a:t>Effect of simplification of model is also explored</a:t>
+            </a:r>
+            <a:endParaRPr lang="en-GB" dirty="0"/>
+          </a:p>
+        </p:txBody>
+      </p:sp>
+    </p:spTree>
+    <p:extLst>
+      <p:ext uri="{BB962C8B-B14F-4D97-AF65-F5344CB8AC3E}">
+        <p14:creationId xmlns:p14="http://schemas.microsoft.com/office/powerpoint/2010/main" val="1833941494"/>
+      </p:ext>
+    </p:extLst>
+  </p:cSld>
+  <p:clrMapOvr>
+    <a:masterClrMapping/>
+  </p:clrMapOvr>
+  <p:timing>
+    <p:tnLst>
+      <p:par>
+        <p:cTn id="1" dur="indefinite" restart="never" nodeType="tmRoot"/>
+      </p:par>
+    </p:tnLst>
+  </p:timing>
+</p:sld>
+</file>
+
+<file path=ppt/slides/slide6.xml><?xml version="1.0" encoding="utf-8"?>
+<p:sld xmlns:a="http://schemas.openxmlformats.org/drawingml/2006/main" xmlns:r="http://schemas.openxmlformats.org/officeDocument/2006/relationships" xmlns:p="http://schemas.openxmlformats.org/presentationml/2006/main">
+  <p:cSld>
+    <p:spTree>
+      <p:nvGrpSpPr>
+        <p:cNvPr id="1" name=""/>
+        <p:cNvGrpSpPr/>
+        <p:nvPr/>
+      </p:nvGrpSpPr>
+      <p:grpSpPr>
+        <a:xfrm>
+          <a:off x="0" y="0"/>
+          <a:ext cx="0" cy="0"/>
+          <a:chOff x="0" y="0"/>
+          <a:chExt cx="0" cy="0"/>
+        </a:xfrm>
+      </p:grpSpPr>
+      <p:sp>
+        <p:nvSpPr>
+          <p:cNvPr id="2" name="Title 1"/>
+          <p:cNvSpPr>
+            <a:spLocks noGrp="1"/>
+          </p:cNvSpPr>
+          <p:nvPr>
+            <p:ph type="title"/>
+          </p:nvPr>
+        </p:nvSpPr>
+        <p:spPr/>
+        <p:txBody>
+          <a:bodyPr/>
+          <a:lstStyle/>
+          <a:p>
+            <a:r>
               <a:rPr lang="en-US" dirty="0" smtClean="0"/>
               <a:t>Assumptions</a:t>
             </a:r>
@@ -7455,7 +8209,7 @@
   <p:timing>
     <p:tnLst>
       <p:par>
-        <p:cTn xmlns:p14="http://schemas.microsoft.com/office/powerpoint/2010/main" id="1" dur="indefinite" restart="never" nodeType="tmRoot">
+        <p:cTn id="1" dur="indefinite" restart="never" nodeType="tmRoot">
           <p:childTnLst>
             <p:seq concurrent="1" nextAc="seek">
               <p:cTn id="2" dur="indefinite" nodeType="mainSeq">
@@ -7833,7 +8587,7 @@
 </p:sld>
 </file>
 
-<file path=ppt/slides/slide5.xml><?xml version="1.0" encoding="utf-8"?>
+<file path=ppt/slides/slide7.xml><?xml version="1.0" encoding="utf-8"?>
 <p:sld xmlns:a="http://schemas.openxmlformats.org/drawingml/2006/main" xmlns:r="http://schemas.openxmlformats.org/officeDocument/2006/relationships" xmlns:p="http://schemas.openxmlformats.org/presentationml/2006/main">
   <p:cSld>
     <p:spTree>
@@ -7904,7 +8658,11 @@
                 </a:pPr>
                 <a:r>
                   <a:rPr lang="en-US" dirty="0" smtClean="0"/>
-                  <a:t> represents individual i’s health</a:t>
+                  <a:t> </a:t>
+                </a:r>
+                <a:r>
+                  <a:rPr lang="en-US" dirty="0" smtClean="0"/>
+                  <a:t>represents individual i’s health</a:t>
                 </a:r>
               </a:p>
               <a:p>
@@ -8016,7 +8774,7 @@
   <p:timing>
     <p:tnLst>
       <p:par>
-        <p:cTn xmlns:p14="http://schemas.microsoft.com/office/powerpoint/2010/main" id="1" dur="indefinite" restart="never" nodeType="tmRoot">
+        <p:cTn id="1" dur="indefinite" restart="never" nodeType="tmRoot">
           <p:childTnLst>
             <p:seq concurrent="1" nextAc="seek">
               <p:cTn id="2" dur="indefinite" nodeType="mainSeq">
@@ -8412,7 +9170,7 @@
 </p:sld>
 </file>
 
-<file path=ppt/slides/slide6.xml><?xml version="1.0" encoding="utf-8"?>
+<file path=ppt/slides/slide8.xml><?xml version="1.0" encoding="utf-8"?>
 <p:sld xmlns:a="http://schemas.openxmlformats.org/drawingml/2006/main" xmlns:r="http://schemas.openxmlformats.org/officeDocument/2006/relationships" xmlns:p="http://schemas.openxmlformats.org/presentationml/2006/main">
   <p:cSld>
     <p:spTree>
@@ -8634,7 +9392,7 @@
   <p:timing>
     <p:tnLst>
       <p:par>
-        <p:cTn xmlns:p14="http://schemas.microsoft.com/office/powerpoint/2010/main" id="1" dur="indefinite" restart="never" nodeType="tmRoot">
+        <p:cTn id="1" dur="indefinite" restart="never" nodeType="tmRoot">
           <p:childTnLst>
             <p:seq concurrent="1" nextAc="seek">
               <p:cTn id="2" dur="indefinite" nodeType="mainSeq">
@@ -9281,7 +10039,7 @@
 </p:sld>
 </file>
 
-<file path=ppt/slides/slide7.xml><?xml version="1.0" encoding="utf-8"?>
+<file path=ppt/slides/slide9.xml><?xml version="1.0" encoding="utf-8"?>
 <p:sld xmlns:a="http://schemas.openxmlformats.org/drawingml/2006/main" xmlns:r="http://schemas.openxmlformats.org/officeDocument/2006/relationships" xmlns:p="http://schemas.openxmlformats.org/presentationml/2006/main">
   <p:cSld>
     <p:spTree>
@@ -9503,7 +10261,7 @@
   <p:timing>
     <p:tnLst>
       <p:par>
-        <p:cTn xmlns:p14="http://schemas.microsoft.com/office/powerpoint/2010/main" id="1" dur="indefinite" restart="never" nodeType="tmRoot">
+        <p:cTn id="1" dur="indefinite" restart="never" nodeType="tmRoot">
           <p:childTnLst>
             <p:seq concurrent="1" nextAc="seek">
               <p:cTn id="2" dur="indefinite" nodeType="mainSeq">
@@ -10150,277 +10908,6 @@
 </p:sld>
 </file>
 
-<file path=ppt/slides/slide8.xml><?xml version="1.0" encoding="utf-8"?>
-<p:sld xmlns:a="http://schemas.openxmlformats.org/drawingml/2006/main" xmlns:r="http://schemas.openxmlformats.org/officeDocument/2006/relationships" xmlns:p="http://schemas.openxmlformats.org/presentationml/2006/main">
-  <p:cSld>
-    <p:spTree>
-      <p:nvGrpSpPr>
-        <p:cNvPr id="1" name=""/>
-        <p:cNvGrpSpPr/>
-        <p:nvPr/>
-      </p:nvGrpSpPr>
-      <p:grpSpPr>
-        <a:xfrm>
-          <a:off x="0" y="0"/>
-          <a:ext cx="0" cy="0"/>
-          <a:chOff x="0" y="0"/>
-          <a:chExt cx="0" cy="0"/>
-        </a:xfrm>
-      </p:grpSpPr>
-      <p:sp>
-        <p:nvSpPr>
-          <p:cNvPr id="2" name="Title 1"/>
-          <p:cNvSpPr>
-            <a:spLocks noGrp="1"/>
-          </p:cNvSpPr>
-          <p:nvPr>
-            <p:ph type="title"/>
-          </p:nvPr>
-        </p:nvSpPr>
-        <p:spPr/>
-        <p:txBody>
-          <a:bodyPr/>
-          <a:lstStyle/>
-          <a:p>
-            <a:r>
-              <a:rPr lang="en-US" dirty="0" smtClean="0"/>
-              <a:t>Results and their interpretations.</a:t>
-            </a:r>
-            <a:endParaRPr lang="en-US" dirty="0"/>
-          </a:p>
-        </p:txBody>
-      </p:sp>
-    </p:spTree>
-    <p:extLst>
-      <p:ext uri="{BB962C8B-B14F-4D97-AF65-F5344CB8AC3E}">
-        <p14:creationId xmlns:p14="http://schemas.microsoft.com/office/powerpoint/2010/main" val="2056232160"/>
-      </p:ext>
-    </p:extLst>
-  </p:cSld>
-  <p:clrMapOvr>
-    <a:masterClrMapping/>
-  </p:clrMapOvr>
-  <p:timing>
-    <p:tnLst>
-      <p:par>
-        <p:cTn xmlns:p14="http://schemas.microsoft.com/office/powerpoint/2010/main" id="1" dur="indefinite" restart="never" nodeType="tmRoot"/>
-      </p:par>
-    </p:tnLst>
-  </p:timing>
-</p:sld>
-</file>
-
-<file path=ppt/slides/slide9.xml><?xml version="1.0" encoding="utf-8"?>
-<p:sld xmlns:a="http://schemas.openxmlformats.org/drawingml/2006/main" xmlns:r="http://schemas.openxmlformats.org/officeDocument/2006/relationships" xmlns:p="http://schemas.openxmlformats.org/presentationml/2006/main">
-  <p:cSld>
-    <p:spTree>
-      <p:nvGrpSpPr>
-        <p:cNvPr id="1" name=""/>
-        <p:cNvGrpSpPr/>
-        <p:nvPr/>
-      </p:nvGrpSpPr>
-      <p:grpSpPr>
-        <a:xfrm>
-          <a:off x="0" y="0"/>
-          <a:ext cx="0" cy="0"/>
-          <a:chOff x="0" y="0"/>
-          <a:chExt cx="0" cy="0"/>
-        </a:xfrm>
-      </p:grpSpPr>
-      <p:sp>
-        <p:nvSpPr>
-          <p:cNvPr id="2" name="Title 1"/>
-          <p:cNvSpPr>
-            <a:spLocks noGrp="1"/>
-          </p:cNvSpPr>
-          <p:nvPr>
-            <p:ph type="title"/>
-          </p:nvPr>
-        </p:nvSpPr>
-        <p:spPr/>
-        <p:txBody>
-          <a:bodyPr/>
-          <a:lstStyle/>
-          <a:p>
-            <a:r>
-              <a:rPr lang="en-US" dirty="0" smtClean="0"/>
-              <a:t>Small-world Networks</a:t>
-            </a:r>
-            <a:endParaRPr lang="en-US" dirty="0"/>
-          </a:p>
-        </p:txBody>
-      </p:sp>
-      <p:pic>
-        <p:nvPicPr>
-          <p:cNvPr id="6" name="Content Placeholder 5" descr="Wattson.png"/>
-          <p:cNvPicPr>
-            <a:picLocks noGrp="1" noChangeAspect="1"/>
-          </p:cNvPicPr>
-          <p:nvPr>
-            <p:ph idx="1"/>
-          </p:nvPr>
-        </p:nvPicPr>
-        <p:blipFill rotWithShape="1">
-          <a:blip r:embed="rId2">
-            <a:extLst>
-              <a:ext uri="{28A0092B-C50C-407E-A947-70E740481C1C}">
-                <a14:useLocalDpi xmlns:a14="http://schemas.microsoft.com/office/drawing/2010/main" val="0"/>
-              </a:ext>
-            </a:extLst>
-          </a:blip>
-          <a:srcRect r="37"/>
-          <a:stretch/>
-        </p:blipFill>
-        <p:spPr>
-          <a:xfrm>
-            <a:off x="822960" y="1737361"/>
-            <a:ext cx="5139272" cy="4557656"/>
-          </a:xfrm>
-        </p:spPr>
-      </p:pic>
-      <p:sp>
-        <p:nvSpPr>
-          <p:cNvPr id="3" name="TextBox 2"/>
-          <p:cNvSpPr txBox="1"/>
-          <p:nvPr/>
-        </p:nvSpPr>
-        <p:spPr>
-          <a:xfrm>
-            <a:off x="6165639" y="1808785"/>
-            <a:ext cx="3147015" cy="3416320"/>
-          </a:xfrm>
-          <a:prstGeom prst="rect">
-            <a:avLst/>
-          </a:prstGeom>
-          <a:noFill/>
-        </p:spPr>
-        <p:txBody>
-          <a:bodyPr wrap="none" rtlCol="0">
-            <a:spAutoFit/>
-          </a:bodyPr>
-          <a:lstStyle/>
-          <a:p>
-            <a:pPr>
-              <a:buFont typeface="Wingdings" panose="05000000000000000000" pitchFamily="2" charset="2"/>
-              <a:buChar char="Ø"/>
-            </a:pPr>
-            <a:r>
-              <a:rPr lang="en-US" dirty="0" smtClean="0"/>
-              <a:t>Small world networks created</a:t>
-            </a:r>
-            <a:br>
-              <a:rPr lang="en-US" dirty="0" smtClean="0"/>
-            </a:br>
-            <a:r>
-              <a:rPr lang="en-US" dirty="0" smtClean="0"/>
-              <a:t>with Watts-</a:t>
-            </a:r>
-            <a:r>
-              <a:rPr lang="en-US" dirty="0" err="1" smtClean="0"/>
-              <a:t>Strogatz</a:t>
-            </a:r>
-            <a:r>
-              <a:rPr lang="en-US" dirty="0" smtClean="0"/>
-              <a:t/>
-            </a:r>
-            <a:br>
-              <a:rPr lang="en-US" dirty="0" smtClean="0"/>
-            </a:br>
-            <a:endParaRPr lang="en-US" dirty="0" smtClean="0"/>
-          </a:p>
-          <a:p>
-            <a:pPr>
-              <a:buFont typeface="Wingdings" panose="05000000000000000000" pitchFamily="2" charset="2"/>
-              <a:buChar char="Ø"/>
-            </a:pPr>
-            <a:r>
-              <a:rPr lang="en-US" dirty="0" smtClean="0"/>
-              <a:t>The size is fixed, and average</a:t>
-            </a:r>
-            <a:br>
-              <a:rPr lang="en-US" dirty="0" smtClean="0"/>
-            </a:br>
-            <a:r>
-              <a:rPr lang="en-US" dirty="0" smtClean="0"/>
-              <a:t>node degree is at 2 </a:t>
-            </a:r>
-            <a:br>
-              <a:rPr lang="en-US" dirty="0" smtClean="0"/>
-            </a:br>
-            <a:endParaRPr lang="en-US" dirty="0" smtClean="0"/>
-          </a:p>
-          <a:p>
-            <a:pPr>
-              <a:buFont typeface="Wingdings" panose="05000000000000000000" pitchFamily="2" charset="2"/>
-              <a:buChar char="Ø"/>
-            </a:pPr>
-            <a:r>
-              <a:rPr lang="en-US" dirty="0" smtClean="0"/>
-              <a:t>The beta parameter defines</a:t>
-            </a:r>
-            <a:br>
-              <a:rPr lang="en-US" dirty="0" smtClean="0"/>
-            </a:br>
-            <a:r>
-              <a:rPr lang="en-US" dirty="0" smtClean="0"/>
-              <a:t>the probability of rewiring</a:t>
-            </a:r>
-            <a:br>
-              <a:rPr lang="en-US" dirty="0" smtClean="0"/>
-            </a:br>
-            <a:endParaRPr lang="en-US" dirty="0"/>
-          </a:p>
-          <a:p>
-            <a:pPr>
-              <a:buFont typeface="Wingdings" panose="05000000000000000000" pitchFamily="2" charset="2"/>
-              <a:buChar char="Ø"/>
-            </a:pPr>
-            <a:r>
-              <a:rPr lang="en-US" dirty="0" smtClean="0"/>
-              <a:t>Beta=0 is ideal small-world;</a:t>
-            </a:r>
-            <a:br>
-              <a:rPr lang="en-US" dirty="0" smtClean="0"/>
-            </a:br>
-            <a:r>
-              <a:rPr lang="en-US" dirty="0" smtClean="0"/>
-              <a:t>large beta is random network </a:t>
-            </a:r>
-            <a:endParaRPr lang="en-US" dirty="0"/>
-          </a:p>
-          <a:p>
-            <a:pPr>
-              <a:buFont typeface="Wingdings" panose="05000000000000000000" pitchFamily="2" charset="2"/>
-              <a:buChar char="Ø"/>
-            </a:pPr>
-            <a:endParaRPr lang="en-US" dirty="0">
-              <a:solidFill>
-                <a:srgbClr val="00B050"/>
-              </a:solidFill>
-            </a:endParaRPr>
-          </a:p>
-        </p:txBody>
-      </p:sp>
-    </p:spTree>
-    <p:extLst>
-      <p:ext uri="{BB962C8B-B14F-4D97-AF65-F5344CB8AC3E}">
-        <p14:creationId xmlns:p14="http://schemas.microsoft.com/office/powerpoint/2010/main" val="237490160"/>
-      </p:ext>
-    </p:extLst>
-  </p:cSld>
-  <p:clrMapOvr>
-    <a:masterClrMapping/>
-  </p:clrMapOvr>
-  <p:timing>
-    <p:tnLst>
-      <p:par>
-        <p:cTn xmlns:p14="http://schemas.microsoft.com/office/powerpoint/2010/main" id="1" dur="indefinite" restart="never" nodeType="tmRoot"/>
-      </p:par>
-    </p:tnLst>
-  </p:timing>
-</p:sld>
-</file>
-
 <file path=ppt/theme/theme1.xml><?xml version="1.0" encoding="utf-8"?>
 <a:theme xmlns:a="http://schemas.openxmlformats.org/drawingml/2006/main" name="Retrospect">
   <a:themeElements>
@@ -10698,7 +11185,7 @@
   <a:extraClrSchemeLst/>
   <a:extLst>
     <a:ext uri="{05A4C25C-085E-4340-85A3-A5531E510DB2}">
-      <thm15:themeFamily xmlns:thm15="http://schemas.microsoft.com/office/thememl/2012/main" xmlns="" name="Retrospect" id="{5F128B03-DCCA-4EEB-AB3B-CF2899314A46}" vid="{3F1AAB62-24C6-49D2-8E01-B56FAC9A3DCD}"/>
+      <thm15:themeFamily xmlns:thm15="http://schemas.microsoft.com/office/thememl/2012/main" name="Retrospect" id="{5F128B03-DCCA-4EEB-AB3B-CF2899314A46}" vid="{3F1AAB62-24C6-49D2-8E01-B56FAC9A3DCD}"/>
     </a:ext>
   </a:extLst>
 </a:theme>
@@ -10959,7 +11446,7 @@
   <a:extraClrSchemeLst/>
   <a:extLst>
     <a:ext uri="{05A4C25C-085E-4340-85A3-A5531E510DB2}">
-      <thm15:themeFamily xmlns:thm15="http://schemas.microsoft.com/office/thememl/2012/main" xmlns="" name="Office Theme" id="{62F939B6-93AF-4DB8-9C6B-D6C7DFDC589F}" vid="{4A3C46E8-61CC-4603-A589-7422A47A8E4A}"/>
+      <thm15:themeFamily xmlns:thm15="http://schemas.microsoft.com/office/thememl/2012/main" name="Office Theme" id="{62F939B6-93AF-4DB8-9C6B-D6C7DFDC589F}" vid="{4A3C46E8-61CC-4603-A589-7422A47A8E4A}"/>
     </a:ext>
   </a:extLst>
 </a:theme>

</xml_diff>

<commit_message>
Slight change in order
</commit_message>
<xml_diff>
--- a/presentation/disease_spreading_presentation.pptx
+++ b/presentation/disease_spreading_presentation.pptx
@@ -10,9 +10,9 @@
   <p:sldIdLst>
     <p:sldId id="261" r:id="rId2"/>
     <p:sldId id="263" r:id="rId3"/>
-    <p:sldId id="275" r:id="rId4"/>
-    <p:sldId id="262" r:id="rId5"/>
-    <p:sldId id="276" r:id="rId6"/>
+    <p:sldId id="276" r:id="rId4"/>
+    <p:sldId id="275" r:id="rId5"/>
+    <p:sldId id="262" r:id="rId6"/>
     <p:sldId id="264" r:id="rId7"/>
     <p:sldId id="265" r:id="rId8"/>
     <p:sldId id="266" r:id="rId9"/>
@@ -663,15 +663,19 @@
           <a:p>
             <a:r>
               <a:rPr lang="en-GB" dirty="0" smtClean="0"/>
-              <a:t>SIR</a:t>
+              <a:t>We define</a:t>
             </a:r>
             <a:r>
               <a:rPr lang="en-GB" baseline="0" dirty="0" smtClean="0"/>
-              <a:t> and SIS models are based on compartmentalization of the whole population into respectively two or three compartments and study the evolution of number of individuals in each compartments. Correspondingly they use two or three differential equations to model population dynamic. These models have the disadvantage that they cannot account for the dynamics that may arise due to individual behaviour</a:t>
+              <a:t> a robustness metric and use it to study robustness of randomly generated graphs. We use the cascading model by </a:t>
+            </a:r>
+            <a:r>
+              <a:rPr lang="en-GB" baseline="0" dirty="0" err="1" smtClean="0"/>
+              <a:t>Lubos</a:t>
             </a:r>
             <a:r>
               <a:rPr lang="en-GB" baseline="0" dirty="0" smtClean="0"/>
-              <a:t>.</a:t>
+              <a:t> et. al. to model the evolution of disease spread. </a:t>
             </a:r>
           </a:p>
           <a:p>
@@ -680,10 +684,29 @@
           <a:p>
             <a:r>
               <a:rPr lang="en-GB" baseline="0" dirty="0" smtClean="0"/>
-              <a:t>Network Theory Based models try to capture the transfer of disease from one individual to another and study the dynamics of evolution of the epidemics. Based on the method of simulation of spread of disease, different methods are used. In one of the models, rate with which a node gets infected is equal to product of transmission rate and number of infected neighbours. In one of the models, a randomly chosen vertex can probabilistically infect any or all of its neighbours.</a:t>
-            </a:r>
-          </a:p>
-          <a:p>
+              <a:t>Rather than trying to model evolution of epidemic within a given population, as done by the models discussed earlier, we interpret the spread of disease from one city to another.</a:t>
+            </a:r>
+          </a:p>
+          <a:p>
+            <a:endParaRPr lang="en-GB" baseline="0" dirty="0" smtClean="0"/>
+          </a:p>
+          <a:p>
+            <a:r>
+              <a:rPr lang="en-GB" baseline="0" dirty="0" smtClean="0"/>
+              <a:t>We also explore what happens if we </a:t>
+            </a:r>
+            <a:r>
+              <a:rPr lang="en-GB" baseline="0" dirty="0" err="1" smtClean="0"/>
+              <a:t>simplifify</a:t>
+            </a:r>
+            <a:r>
+              <a:rPr lang="en-GB" baseline="0" dirty="0" smtClean="0"/>
+              <a:t> the model i.e. disregard the effect of some </a:t>
+            </a:r>
+            <a:r>
+              <a:rPr lang="en-GB" baseline="0" smtClean="0"/>
+              <a:t>parameters from the model.</a:t>
+            </a:r>
             <a:endParaRPr lang="en-GB" dirty="0"/>
           </a:p>
         </p:txBody>
@@ -714,7 +737,7 @@
     </p:spTree>
     <p:extLst>
       <p:ext uri="{BB962C8B-B14F-4D97-AF65-F5344CB8AC3E}">
-        <p14:creationId xmlns:p14="http://schemas.microsoft.com/office/powerpoint/2010/main" val="3004335316"/>
+        <p14:creationId xmlns:p14="http://schemas.microsoft.com/office/powerpoint/2010/main" val="1928663785"/>
       </p:ext>
     </p:extLst>
   </p:cSld>
@@ -769,14 +792,29 @@
           <a:lstStyle/>
           <a:p>
             <a:r>
-              <a:rPr lang="en-US" dirty="0" smtClean="0"/>
-              <a:t>Obvious way to model a networked society is to model it with a network. Decouples the complexity of modeling individual behavior and their </a:t>
-            </a:r>
-            <a:r>
-              <a:rPr lang="en-US" dirty="0" err="1" smtClean="0"/>
-              <a:t>interraction</a:t>
-            </a:r>
-            <a:endParaRPr lang="en-US" dirty="0"/>
+              <a:rPr lang="en-GB" dirty="0" smtClean="0"/>
+              <a:t>SIR</a:t>
+            </a:r>
+            <a:r>
+              <a:rPr lang="en-GB" baseline="0" dirty="0" smtClean="0"/>
+              <a:t> and SIS models are based on compartmentalization of the whole population into respectively two or three compartments and study the evolution of number of individuals in each compartments. Correspondingly they use two or three differential equations to model population dynamic. These models have the disadvantage that they cannot account for the dynamics that may arise due to individual behaviour</a:t>
+            </a:r>
+            <a:r>
+              <a:rPr lang="en-GB" baseline="0" dirty="0" smtClean="0"/>
+              <a:t>.</a:t>
+            </a:r>
+          </a:p>
+          <a:p>
+            <a:endParaRPr lang="en-GB" baseline="0" dirty="0" smtClean="0"/>
+          </a:p>
+          <a:p>
+            <a:r>
+              <a:rPr lang="en-GB" baseline="0" dirty="0" smtClean="0"/>
+              <a:t>Network Theory Based models try to capture the transfer of disease from one individual to another and study the dynamics of evolution of the epidemics. Based on the method of simulation of spread of disease, different methods are used. In one of the models, rate with which a node gets infected is equal to product of transmission rate and number of infected neighbours. In one of the models, a randomly chosen vertex can probabilistically infect any or all of its neighbours.</a:t>
+            </a:r>
+          </a:p>
+          <a:p>
+            <a:endParaRPr lang="en-GB" dirty="0"/>
           </a:p>
         </p:txBody>
       </p:sp>
@@ -806,7 +844,7 @@
     </p:spTree>
     <p:extLst>
       <p:ext uri="{BB962C8B-B14F-4D97-AF65-F5344CB8AC3E}">
-        <p14:creationId xmlns:p14="http://schemas.microsoft.com/office/powerpoint/2010/main" val="3548918832"/>
+        <p14:creationId xmlns:p14="http://schemas.microsoft.com/office/powerpoint/2010/main" val="3004335316"/>
       </p:ext>
     </p:extLst>
   </p:cSld>
@@ -861,52 +899,14 @@
           <a:lstStyle/>
           <a:p>
             <a:r>
-              <a:rPr lang="en-GB" dirty="0" smtClean="0"/>
-              <a:t>We define</a:t>
-            </a:r>
-            <a:r>
-              <a:rPr lang="en-GB" baseline="0" dirty="0" smtClean="0"/>
-              <a:t> a robustness metric and use it to study robustness of randomly generated graphs. We use the cascading model by </a:t>
-            </a:r>
-            <a:r>
-              <a:rPr lang="en-GB" baseline="0" dirty="0" err="1" smtClean="0"/>
-              <a:t>Lubos</a:t>
-            </a:r>
-            <a:r>
-              <a:rPr lang="en-GB" baseline="0" dirty="0" smtClean="0"/>
-              <a:t> et. al. to model the evolution of disease spread. </a:t>
-            </a:r>
-          </a:p>
-          <a:p>
-            <a:endParaRPr lang="en-GB" baseline="0" dirty="0" smtClean="0"/>
-          </a:p>
-          <a:p>
-            <a:r>
-              <a:rPr lang="en-GB" baseline="0" dirty="0" smtClean="0"/>
-              <a:t>Rather than trying to model evolution of epidemic within a given population, as done by the models discussed earlier, we interpret the spread of disease from one city to another.</a:t>
-            </a:r>
-          </a:p>
-          <a:p>
-            <a:endParaRPr lang="en-GB" baseline="0" dirty="0" smtClean="0"/>
-          </a:p>
-          <a:p>
-            <a:r>
-              <a:rPr lang="en-GB" baseline="0" dirty="0" smtClean="0"/>
-              <a:t>We also explore what happens if we </a:t>
-            </a:r>
-            <a:r>
-              <a:rPr lang="en-GB" baseline="0" dirty="0" err="1" smtClean="0"/>
-              <a:t>simplifify</a:t>
-            </a:r>
-            <a:r>
-              <a:rPr lang="en-GB" baseline="0" dirty="0" smtClean="0"/>
-              <a:t> the model i.e. disregard the effect of some </a:t>
-            </a:r>
-            <a:r>
-              <a:rPr lang="en-GB" baseline="0" smtClean="0"/>
-              <a:t>parameters from the model.</a:t>
-            </a:r>
-            <a:endParaRPr lang="en-GB" dirty="0"/>
+              <a:rPr lang="en-US" dirty="0" smtClean="0"/>
+              <a:t>Obvious way to model a networked society is to model it with a network. Decouples the complexity of modeling individual behavior and their </a:t>
+            </a:r>
+            <a:r>
+              <a:rPr lang="en-US" dirty="0" err="1" smtClean="0"/>
+              <a:t>interraction</a:t>
+            </a:r>
+            <a:endParaRPr lang="en-US" dirty="0"/>
           </a:p>
         </p:txBody>
       </p:sp>
@@ -936,7 +936,7 @@
     </p:spTree>
     <p:extLst>
       <p:ext uri="{BB962C8B-B14F-4D97-AF65-F5344CB8AC3E}">
-        <p14:creationId xmlns:p14="http://schemas.microsoft.com/office/powerpoint/2010/main" val="1928663785"/>
+        <p14:creationId xmlns:p14="http://schemas.microsoft.com/office/powerpoint/2010/main" val="3548918832"/>
       </p:ext>
     </p:extLst>
   </p:cSld>
@@ -7857,6 +7857,227 @@
           <a:p>
             <a:r>
               <a:rPr lang="en-GB" dirty="0" smtClean="0"/>
+              <a:t>Research Problem</a:t>
+            </a:r>
+            <a:endParaRPr lang="en-GB" dirty="0"/>
+          </a:p>
+        </p:txBody>
+      </p:sp>
+      <p:sp>
+        <p:nvSpPr>
+          <p:cNvPr id="3" name="Content Placeholder 2"/>
+          <p:cNvSpPr>
+            <a:spLocks noGrp="1"/>
+          </p:cNvSpPr>
+          <p:nvPr>
+            <p:ph idx="1"/>
+          </p:nvPr>
+        </p:nvSpPr>
+        <p:spPr/>
+        <p:txBody>
+          <a:bodyPr/>
+          <a:lstStyle/>
+          <a:p>
+            <a:pPr>
+              <a:buFont typeface="Wingdings" panose="05000000000000000000" pitchFamily="2" charset="2"/>
+              <a:buChar char="Ø"/>
+            </a:pPr>
+            <a:r>
+              <a:rPr lang="en-GB" dirty="0" smtClean="0"/>
+              <a:t>Determine Robustness of Randomly Generated Graphs</a:t>
+            </a:r>
+          </a:p>
+          <a:p>
+            <a:pPr>
+              <a:buFont typeface="Wingdings" panose="05000000000000000000" pitchFamily="2" charset="2"/>
+              <a:buChar char="Ø"/>
+            </a:pPr>
+            <a:r>
+              <a:rPr lang="en-GB" dirty="0" smtClean="0"/>
+              <a:t>Effect of simplification of model is also explored</a:t>
+            </a:r>
+            <a:endParaRPr lang="en-GB" dirty="0"/>
+          </a:p>
+        </p:txBody>
+      </p:sp>
+    </p:spTree>
+    <p:extLst>
+      <p:ext uri="{BB962C8B-B14F-4D97-AF65-F5344CB8AC3E}">
+        <p14:creationId xmlns:p14="http://schemas.microsoft.com/office/powerpoint/2010/main" val="1833941494"/>
+      </p:ext>
+    </p:extLst>
+  </p:cSld>
+  <p:clrMapOvr>
+    <a:masterClrMapping/>
+  </p:clrMapOvr>
+  <p:timing>
+    <p:tnLst>
+      <p:par>
+        <p:cTn id="1" dur="indefinite" restart="never" nodeType="tmRoot">
+          <p:childTnLst>
+            <p:seq concurrent="1" nextAc="seek">
+              <p:cTn id="2" dur="indefinite" nodeType="mainSeq">
+                <p:childTnLst>
+                  <p:par>
+                    <p:cTn id="3" fill="hold">
+                      <p:stCondLst>
+                        <p:cond delay="indefinite"/>
+                      </p:stCondLst>
+                      <p:childTnLst>
+                        <p:par>
+                          <p:cTn id="4" fill="hold">
+                            <p:stCondLst>
+                              <p:cond delay="0"/>
+                            </p:stCondLst>
+                            <p:childTnLst>
+                              <p:par>
+                                <p:cTn id="5" presetID="1" presetClass="entr" presetSubtype="0" fill="hold" grpId="0" nodeType="clickEffect">
+                                  <p:stCondLst>
+                                    <p:cond delay="0"/>
+                                  </p:stCondLst>
+                                  <p:childTnLst>
+                                    <p:set>
+                                      <p:cBhvr>
+                                        <p:cTn id="6" dur="1" fill="hold">
+                                          <p:stCondLst>
+                                            <p:cond delay="0"/>
+                                          </p:stCondLst>
+                                        </p:cTn>
+                                        <p:tgtEl>
+                                          <p:spTgt spid="3">
+                                            <p:txEl>
+                                              <p:pRg st="0" end="0"/>
+                                            </p:txEl>
+                                          </p:spTgt>
+                                        </p:tgtEl>
+                                        <p:attrNameLst>
+                                          <p:attrName>style.visibility</p:attrName>
+                                        </p:attrNameLst>
+                                      </p:cBhvr>
+                                      <p:to>
+                                        <p:strVal val="visible"/>
+                                      </p:to>
+                                    </p:set>
+                                  </p:childTnLst>
+                                </p:cTn>
+                              </p:par>
+                            </p:childTnLst>
+                          </p:cTn>
+                        </p:par>
+                      </p:childTnLst>
+                    </p:cTn>
+                  </p:par>
+                  <p:par>
+                    <p:cTn id="7" fill="hold">
+                      <p:stCondLst>
+                        <p:cond delay="indefinite"/>
+                      </p:stCondLst>
+                      <p:childTnLst>
+                        <p:par>
+                          <p:cTn id="8" fill="hold">
+                            <p:stCondLst>
+                              <p:cond delay="0"/>
+                            </p:stCondLst>
+                            <p:childTnLst>
+                              <p:par>
+                                <p:cTn id="9" presetID="1" presetClass="entr" presetSubtype="0" fill="hold" grpId="0" nodeType="clickEffect">
+                                  <p:stCondLst>
+                                    <p:cond delay="0"/>
+                                  </p:stCondLst>
+                                  <p:childTnLst>
+                                    <p:set>
+                                      <p:cBhvr>
+                                        <p:cTn id="10" dur="1" fill="hold">
+                                          <p:stCondLst>
+                                            <p:cond delay="0"/>
+                                          </p:stCondLst>
+                                        </p:cTn>
+                                        <p:tgtEl>
+                                          <p:spTgt spid="3">
+                                            <p:txEl>
+                                              <p:pRg st="1" end="1"/>
+                                            </p:txEl>
+                                          </p:spTgt>
+                                        </p:tgtEl>
+                                        <p:attrNameLst>
+                                          <p:attrName>style.visibility</p:attrName>
+                                        </p:attrNameLst>
+                                      </p:cBhvr>
+                                      <p:to>
+                                        <p:strVal val="visible"/>
+                                      </p:to>
+                                    </p:set>
+                                  </p:childTnLst>
+                                </p:cTn>
+                              </p:par>
+                            </p:childTnLst>
+                          </p:cTn>
+                        </p:par>
+                      </p:childTnLst>
+                    </p:cTn>
+                  </p:par>
+                </p:childTnLst>
+              </p:cTn>
+              <p:prevCondLst>
+                <p:cond evt="onPrev" delay="0">
+                  <p:tgtEl>
+                    <p:sldTgt/>
+                  </p:tgtEl>
+                </p:cond>
+              </p:prevCondLst>
+              <p:nextCondLst>
+                <p:cond evt="onNext" delay="0">
+                  <p:tgtEl>
+                    <p:sldTgt/>
+                  </p:tgtEl>
+                </p:cond>
+              </p:nextCondLst>
+            </p:seq>
+          </p:childTnLst>
+        </p:cTn>
+      </p:par>
+    </p:tnLst>
+    <p:bldLst>
+      <p:bldP spid="3" grpId="0" build="p"/>
+    </p:bldLst>
+  </p:timing>
+</p:sld>
+</file>
+
+<file path=ppt/slides/slide4.xml><?xml version="1.0" encoding="utf-8"?>
+<p:sld xmlns:a="http://schemas.openxmlformats.org/drawingml/2006/main" xmlns:r="http://schemas.openxmlformats.org/officeDocument/2006/relationships" xmlns:p="http://schemas.openxmlformats.org/presentationml/2006/main">
+  <p:cSld>
+    <p:spTree>
+      <p:nvGrpSpPr>
+        <p:cNvPr id="1" name=""/>
+        <p:cNvGrpSpPr/>
+        <p:nvPr/>
+      </p:nvGrpSpPr>
+      <p:grpSpPr>
+        <a:xfrm>
+          <a:off x="0" y="0"/>
+          <a:ext cx="0" cy="0"/>
+          <a:chOff x="0" y="0"/>
+          <a:chExt cx="0" cy="0"/>
+        </a:xfrm>
+      </p:grpSpPr>
+      <p:sp>
+        <p:nvSpPr>
+          <p:cNvPr id="2" name="Title 1"/>
+          <p:cNvSpPr>
+            <a:spLocks noGrp="1"/>
+          </p:cNvSpPr>
+          <p:nvPr>
+            <p:ph type="title"/>
+          </p:nvPr>
+        </p:nvSpPr>
+        <p:spPr/>
+        <p:txBody>
+          <a:bodyPr/>
+          <a:lstStyle/>
+          <a:p>
+            <a:r>
+              <a:rPr lang="en-GB" dirty="0" smtClean="0"/>
               <a:t>Relevant Works</a:t>
             </a:r>
             <a:endParaRPr lang="en-GB" dirty="0"/>
@@ -8256,7 +8477,7 @@
 </p:sld>
 </file>
 
-<file path=ppt/slides/slide4.xml><?xml version="1.0" encoding="utf-8"?>
+<file path=ppt/slides/slide5.xml><?xml version="1.0" encoding="utf-8"?>
 <p:sld xmlns:a="http://schemas.openxmlformats.org/drawingml/2006/main" xmlns:r="http://schemas.openxmlformats.org/officeDocument/2006/relationships" xmlns:p="http://schemas.openxmlformats.org/presentationml/2006/main">
   <p:cSld>
     <p:spTree>
@@ -8843,227 +9064,6 @@
         </p:cTn>
       </p:par>
     </p:tnLst>
-  </p:timing>
-</p:sld>
-</file>
-
-<file path=ppt/slides/slide5.xml><?xml version="1.0" encoding="utf-8"?>
-<p:sld xmlns:a="http://schemas.openxmlformats.org/drawingml/2006/main" xmlns:r="http://schemas.openxmlformats.org/officeDocument/2006/relationships" xmlns:p="http://schemas.openxmlformats.org/presentationml/2006/main">
-  <p:cSld>
-    <p:spTree>
-      <p:nvGrpSpPr>
-        <p:cNvPr id="1" name=""/>
-        <p:cNvGrpSpPr/>
-        <p:nvPr/>
-      </p:nvGrpSpPr>
-      <p:grpSpPr>
-        <a:xfrm>
-          <a:off x="0" y="0"/>
-          <a:ext cx="0" cy="0"/>
-          <a:chOff x="0" y="0"/>
-          <a:chExt cx="0" cy="0"/>
-        </a:xfrm>
-      </p:grpSpPr>
-      <p:sp>
-        <p:nvSpPr>
-          <p:cNvPr id="2" name="Title 1"/>
-          <p:cNvSpPr>
-            <a:spLocks noGrp="1"/>
-          </p:cNvSpPr>
-          <p:nvPr>
-            <p:ph type="title"/>
-          </p:nvPr>
-        </p:nvSpPr>
-        <p:spPr/>
-        <p:txBody>
-          <a:bodyPr/>
-          <a:lstStyle/>
-          <a:p>
-            <a:r>
-              <a:rPr lang="en-GB" dirty="0" smtClean="0"/>
-              <a:t>Research Problem</a:t>
-            </a:r>
-            <a:endParaRPr lang="en-GB" dirty="0"/>
-          </a:p>
-        </p:txBody>
-      </p:sp>
-      <p:sp>
-        <p:nvSpPr>
-          <p:cNvPr id="3" name="Content Placeholder 2"/>
-          <p:cNvSpPr>
-            <a:spLocks noGrp="1"/>
-          </p:cNvSpPr>
-          <p:nvPr>
-            <p:ph idx="1"/>
-          </p:nvPr>
-        </p:nvSpPr>
-        <p:spPr/>
-        <p:txBody>
-          <a:bodyPr/>
-          <a:lstStyle/>
-          <a:p>
-            <a:pPr>
-              <a:buFont typeface="Wingdings" panose="05000000000000000000" pitchFamily="2" charset="2"/>
-              <a:buChar char="Ø"/>
-            </a:pPr>
-            <a:r>
-              <a:rPr lang="en-GB" dirty="0" smtClean="0"/>
-              <a:t>Determine Robustness of Randomly Generated Graphs</a:t>
-            </a:r>
-          </a:p>
-          <a:p>
-            <a:pPr>
-              <a:buFont typeface="Wingdings" panose="05000000000000000000" pitchFamily="2" charset="2"/>
-              <a:buChar char="Ø"/>
-            </a:pPr>
-            <a:r>
-              <a:rPr lang="en-GB" dirty="0" smtClean="0"/>
-              <a:t>Effect of simplification of model is also explored</a:t>
-            </a:r>
-            <a:endParaRPr lang="en-GB" dirty="0"/>
-          </a:p>
-        </p:txBody>
-      </p:sp>
-    </p:spTree>
-    <p:extLst>
-      <p:ext uri="{BB962C8B-B14F-4D97-AF65-F5344CB8AC3E}">
-        <p14:creationId xmlns:p14="http://schemas.microsoft.com/office/powerpoint/2010/main" val="1833941494"/>
-      </p:ext>
-    </p:extLst>
-  </p:cSld>
-  <p:clrMapOvr>
-    <a:masterClrMapping/>
-  </p:clrMapOvr>
-  <p:timing>
-    <p:tnLst>
-      <p:par>
-        <p:cTn id="1" dur="indefinite" restart="never" nodeType="tmRoot">
-          <p:childTnLst>
-            <p:seq concurrent="1" nextAc="seek">
-              <p:cTn id="2" dur="indefinite" nodeType="mainSeq">
-                <p:childTnLst>
-                  <p:par>
-                    <p:cTn id="3" fill="hold">
-                      <p:stCondLst>
-                        <p:cond delay="indefinite"/>
-                      </p:stCondLst>
-                      <p:childTnLst>
-                        <p:par>
-                          <p:cTn id="4" fill="hold">
-                            <p:stCondLst>
-                              <p:cond delay="0"/>
-                            </p:stCondLst>
-                            <p:childTnLst>
-                              <p:par>
-                                <p:cTn id="5" presetID="1" presetClass="entr" presetSubtype="0" fill="hold" grpId="0" nodeType="clickEffect">
-                                  <p:stCondLst>
-                                    <p:cond delay="0"/>
-                                  </p:stCondLst>
-                                  <p:childTnLst>
-                                    <p:set>
-                                      <p:cBhvr>
-                                        <p:cTn id="6" dur="1" fill="hold">
-                                          <p:stCondLst>
-                                            <p:cond delay="0"/>
-                                          </p:stCondLst>
-                                        </p:cTn>
-                                        <p:tgtEl>
-                                          <p:spTgt spid="3">
-                                            <p:txEl>
-                                              <p:pRg st="0" end="0"/>
-                                            </p:txEl>
-                                          </p:spTgt>
-                                        </p:tgtEl>
-                                        <p:attrNameLst>
-                                          <p:attrName>style.visibility</p:attrName>
-                                        </p:attrNameLst>
-                                      </p:cBhvr>
-                                      <p:to>
-                                        <p:strVal val="visible"/>
-                                      </p:to>
-                                    </p:set>
-                                  </p:childTnLst>
-                                </p:cTn>
-                              </p:par>
-                            </p:childTnLst>
-                          </p:cTn>
-                        </p:par>
-                      </p:childTnLst>
-                    </p:cTn>
-                  </p:par>
-                  <p:par>
-                    <p:cTn id="7" fill="hold">
-                      <p:stCondLst>
-                        <p:cond delay="indefinite"/>
-                      </p:stCondLst>
-                      <p:childTnLst>
-                        <p:par>
-                          <p:cTn id="8" fill="hold">
-                            <p:stCondLst>
-                              <p:cond delay="0"/>
-                            </p:stCondLst>
-                            <p:childTnLst>
-                              <p:par>
-                                <p:cTn id="9" presetID="1" presetClass="entr" presetSubtype="0" fill="hold" grpId="0" nodeType="clickEffect">
-                                  <p:stCondLst>
-                                    <p:cond delay="0"/>
-                                  </p:stCondLst>
-                                  <p:childTnLst>
-                                    <p:set>
-                                      <p:cBhvr>
-                                        <p:cTn id="10" dur="1" fill="hold">
-                                          <p:stCondLst>
-                                            <p:cond delay="0"/>
-                                          </p:stCondLst>
-                                        </p:cTn>
-                                        <p:tgtEl>
-                                          <p:spTgt spid="3">
-                                            <p:txEl>
-                                              <p:pRg st="1" end="1"/>
-                                            </p:txEl>
-                                          </p:spTgt>
-                                        </p:tgtEl>
-                                        <p:attrNameLst>
-                                          <p:attrName>style.visibility</p:attrName>
-                                        </p:attrNameLst>
-                                      </p:cBhvr>
-                                      <p:to>
-                                        <p:strVal val="visible"/>
-                                      </p:to>
-                                    </p:set>
-                                  </p:childTnLst>
-                                </p:cTn>
-                              </p:par>
-                            </p:childTnLst>
-                          </p:cTn>
-                        </p:par>
-                      </p:childTnLst>
-                    </p:cTn>
-                  </p:par>
-                </p:childTnLst>
-              </p:cTn>
-              <p:prevCondLst>
-                <p:cond evt="onPrev" delay="0">
-                  <p:tgtEl>
-                    <p:sldTgt/>
-                  </p:tgtEl>
-                </p:cond>
-              </p:prevCondLst>
-              <p:nextCondLst>
-                <p:cond evt="onNext" delay="0">
-                  <p:tgtEl>
-                    <p:sldTgt/>
-                  </p:tgtEl>
-                </p:cond>
-              </p:nextCondLst>
-            </p:seq>
-          </p:childTnLst>
-        </p:cTn>
-      </p:par>
-    </p:tnLst>
-    <p:bldLst>
-      <p:bldP spid="3" grpId="0" build="p"/>
-    </p:bldLst>
   </p:timing>
 </p:sld>
 </file>

</xml_diff>